<commit_message>
added pictures to model slides
</commit_message>
<xml_diff>
--- a/presentation/Präsentation.pptx
+++ b/presentation/Präsentation.pptx
@@ -10,10 +10,10 @@
     <p:sldMasterId id="2147483697" r:id="rId6"/>
   </p:sldMasterIdLst>
   <p:notesMasterIdLst>
-    <p:notesMasterId r:id="rId37"/>
+    <p:notesMasterId r:id="rId38"/>
   </p:notesMasterIdLst>
   <p:handoutMasterIdLst>
-    <p:handoutMasterId r:id="rId38"/>
+    <p:handoutMasterId r:id="rId39"/>
   </p:handoutMasterIdLst>
   <p:sldIdLst>
     <p:sldId id="355" r:id="rId7"/>
@@ -23,29 +23,30 @@
     <p:sldId id="404" r:id="rId11"/>
     <p:sldId id="400" r:id="rId12"/>
     <p:sldId id="401" r:id="rId13"/>
-    <p:sldId id="402" r:id="rId14"/>
-    <p:sldId id="403" r:id="rId15"/>
-    <p:sldId id="398" r:id="rId16"/>
-    <p:sldId id="405" r:id="rId17"/>
-    <p:sldId id="369" r:id="rId18"/>
-    <p:sldId id="370" r:id="rId19"/>
-    <p:sldId id="392" r:id="rId20"/>
-    <p:sldId id="371" r:id="rId21"/>
-    <p:sldId id="372" r:id="rId22"/>
-    <p:sldId id="373" r:id="rId23"/>
-    <p:sldId id="394" r:id="rId24"/>
-    <p:sldId id="375" r:id="rId25"/>
-    <p:sldId id="376" r:id="rId26"/>
-    <p:sldId id="393" r:id="rId27"/>
-    <p:sldId id="391" r:id="rId28"/>
-    <p:sldId id="390" r:id="rId29"/>
-    <p:sldId id="378" r:id="rId30"/>
-    <p:sldId id="377" r:id="rId31"/>
-    <p:sldId id="389" r:id="rId32"/>
-    <p:sldId id="379" r:id="rId33"/>
-    <p:sldId id="395" r:id="rId34"/>
-    <p:sldId id="380" r:id="rId35"/>
-    <p:sldId id="381" r:id="rId36"/>
+    <p:sldId id="407" r:id="rId14"/>
+    <p:sldId id="402" r:id="rId15"/>
+    <p:sldId id="403" r:id="rId16"/>
+    <p:sldId id="398" r:id="rId17"/>
+    <p:sldId id="405" r:id="rId18"/>
+    <p:sldId id="369" r:id="rId19"/>
+    <p:sldId id="370" r:id="rId20"/>
+    <p:sldId id="392" r:id="rId21"/>
+    <p:sldId id="371" r:id="rId22"/>
+    <p:sldId id="372" r:id="rId23"/>
+    <p:sldId id="373" r:id="rId24"/>
+    <p:sldId id="394" r:id="rId25"/>
+    <p:sldId id="375" r:id="rId26"/>
+    <p:sldId id="376" r:id="rId27"/>
+    <p:sldId id="393" r:id="rId28"/>
+    <p:sldId id="391" r:id="rId29"/>
+    <p:sldId id="390" r:id="rId30"/>
+    <p:sldId id="378" r:id="rId31"/>
+    <p:sldId id="377" r:id="rId32"/>
+    <p:sldId id="389" r:id="rId33"/>
+    <p:sldId id="379" r:id="rId34"/>
+    <p:sldId id="395" r:id="rId35"/>
+    <p:sldId id="380" r:id="rId36"/>
+    <p:sldId id="381" r:id="rId37"/>
   </p:sldIdLst>
   <p:sldSz cx="9144000" cy="6858000" type="screen4x3"/>
   <p:notesSz cx="9925050" cy="6665913"/>
@@ -1054,7 +1055,7 @@
               <a:pPr>
                 <a:defRPr/>
               </a:pPr>
-              <a:t>08/08/2019</a:t>
+              <a:t>09/08/2019</a:t>
             </a:fld>
             <a:endParaRPr lang="en-GB" dirty="0"/>
           </a:p>
@@ -1273,7 +1274,7 @@
               <a:pPr>
                 <a:defRPr/>
               </a:pPr>
-              <a:t>08/08/2019</a:t>
+              <a:t>09/08/2019</a:t>
             </a:fld>
             <a:endParaRPr lang="en-GB"/>
           </a:p>
@@ -9960,7 +9961,7 @@
           <p:cNvPr id="2" name="Inhaltsplatzhalter 1">
             <a:extLst>
               <a:ext uri="{FF2B5EF4-FFF2-40B4-BE49-F238E27FC236}">
-                <a16:creationId xmlns:a16="http://schemas.microsoft.com/office/drawing/2014/main" id="{AE523D49-BDC2-429A-8195-E6EC189B30AA}"/>
+                <a16:creationId xmlns:a16="http://schemas.microsoft.com/office/drawing/2014/main" id="{DB7CA37A-7A2C-41B9-B688-25C8CC3A05A6}"/>
               </a:ext>
             </a:extLst>
           </p:cNvPr>
@@ -9968,7 +9969,7 @@
             <a:spLocks noGrp="1"/>
           </p:cNvSpPr>
           <p:nvPr>
-            <p:ph idx="1"/>
+            <p:ph idx="14"/>
           </p:nvPr>
         </p:nvSpPr>
         <p:spPr/>
@@ -9981,12 +9982,8 @@
               <a:buChar char="•"/>
             </a:pPr>
             <a:r>
-              <a:rPr lang="de-DE" dirty="0" err="1"/>
-              <a:t>BaseX</a:t>
-            </a:r>
-            <a:r>
               <a:rPr lang="de-DE" dirty="0"/>
-              <a:t> als Datenbank</a:t>
+              <a:t>Extra Feature</a:t>
             </a:r>
           </a:p>
           <a:p>
@@ -9995,20 +9992,8 @@
               <a:buChar char="•"/>
             </a:pPr>
             <a:r>
-              <a:rPr lang="de-DE" dirty="0" err="1"/>
-              <a:t>XQuery</a:t>
-            </a:r>
-            <a:r>
               <a:rPr lang="de-DE" dirty="0"/>
-              <a:t> als funktionale Sprache die </a:t>
-            </a:r>
-            <a:r>
-              <a:rPr lang="de-DE" dirty="0" err="1"/>
-              <a:t>Queries</a:t>
-            </a:r>
-            <a:r>
-              <a:rPr lang="de-DE" dirty="0"/>
-              <a:t> auf XML Datenbanken ausführt</a:t>
+              <a:t>Sinnvoll da Multiplayer über lokales Netzwerk</a:t>
             </a:r>
           </a:p>
           <a:p>
@@ -10018,7 +10003,7 @@
             </a:pPr>
             <a:r>
               <a:rPr lang="de-DE" dirty="0"/>
-              <a:t>Zeichnet sich durch FLOWR-Ausdrücke aus</a:t>
+              <a:t>Spieler können miteinander kommunizieren</a:t>
             </a:r>
           </a:p>
           <a:p>
@@ -10027,30 +10012,8 @@
               <a:buChar char="•"/>
             </a:pPr>
             <a:r>
-              <a:rPr lang="de-DE" dirty="0" err="1"/>
-              <a:t>XQuery</a:t>
-            </a:r>
-            <a:r>
               <a:rPr lang="de-DE" dirty="0"/>
-              <a:t> selbst kann nur von Datenbank lesen</a:t>
-            </a:r>
-          </a:p>
-          <a:p>
-            <a:pPr marL="285750" indent="-285750">
-              <a:buFont typeface="Arial" panose="020B0604020202020204" pitchFamily="34" charset="0"/>
-              <a:buChar char="•"/>
-            </a:pPr>
-            <a:r>
-              <a:rPr lang="de-DE" dirty="0"/>
-              <a:t>Deswegen </a:t>
-            </a:r>
-            <a:r>
-              <a:rPr lang="de-DE" dirty="0" err="1"/>
-              <a:t>XQuery</a:t>
-            </a:r>
-            <a:r>
-              <a:rPr lang="de-DE" dirty="0"/>
-              <a:t> Update Facility</a:t>
+              <a:t>Information wenn andere Spieler beitreten oder das Spiel verlassen</a:t>
             </a:r>
           </a:p>
         </p:txBody>
@@ -10060,7 +10023,7 @@
           <p:cNvPr id="3" name="Foliennummernplatzhalter 2">
             <a:extLst>
               <a:ext uri="{FF2B5EF4-FFF2-40B4-BE49-F238E27FC236}">
-                <a16:creationId xmlns:a16="http://schemas.microsoft.com/office/drawing/2014/main" id="{31772658-6DB8-4140-BDD4-05D879326A72}"/>
+                <a16:creationId xmlns:a16="http://schemas.microsoft.com/office/drawing/2014/main" id="{AD81C2EF-FD85-4A18-8F03-A0DBBCD700AD}"/>
               </a:ext>
             </a:extLst>
           </p:cNvPr>
@@ -10068,7 +10031,7 @@
             <a:spLocks noGrp="1"/>
           </p:cNvSpPr>
           <p:nvPr>
-            <p:ph type="sldNum" sz="quarter" idx="11"/>
+            <p:ph type="sldNum" sz="quarter" idx="16"/>
           </p:nvPr>
         </p:nvSpPr>
         <p:spPr/>
@@ -10090,7 +10053,7 @@
           <p:cNvPr id="4" name="Fußzeilenplatzhalter 3">
             <a:extLst>
               <a:ext uri="{FF2B5EF4-FFF2-40B4-BE49-F238E27FC236}">
-                <a16:creationId xmlns:a16="http://schemas.microsoft.com/office/drawing/2014/main" id="{0F5FC549-12A2-49EA-94CD-7CA8F667B81C}"/>
+                <a16:creationId xmlns:a16="http://schemas.microsoft.com/office/drawing/2014/main" id="{E82CB60E-E2AB-41CB-8A71-7BFD43B8921B}"/>
               </a:ext>
             </a:extLst>
           </p:cNvPr>
@@ -10098,7 +10061,7 @@
             <a:spLocks noGrp="1"/>
           </p:cNvSpPr>
           <p:nvPr>
-            <p:ph type="ftr" sz="quarter" idx="12"/>
+            <p:ph type="ftr" sz="quarter" idx="17"/>
           </p:nvPr>
         </p:nvSpPr>
         <p:spPr/>
@@ -10119,7 +10082,7 @@
           <p:cNvPr id="5" name="Titel 4">
             <a:extLst>
               <a:ext uri="{FF2B5EF4-FFF2-40B4-BE49-F238E27FC236}">
-                <a16:creationId xmlns:a16="http://schemas.microsoft.com/office/drawing/2014/main" id="{BBD62AF3-48A3-446F-8E3B-3F9602C3602A}"/>
+                <a16:creationId xmlns:a16="http://schemas.microsoft.com/office/drawing/2014/main" id="{38CE14CC-717B-4282-83BB-3662A9B1DD62}"/>
               </a:ext>
             </a:extLst>
           </p:cNvPr>
@@ -10136,25 +10099,45 @@
           <a:lstStyle/>
           <a:p>
             <a:r>
-              <a:rPr lang="de-DE" dirty="0" err="1"/>
-              <a:t>Xquery</a:t>
-            </a:r>
-            <a:r>
               <a:rPr lang="de-DE" dirty="0"/>
-              <a:t> &amp; </a:t>
-            </a:r>
-            <a:r>
-              <a:rPr lang="de-DE" dirty="0" err="1"/>
-              <a:t>BaseX</a:t>
-            </a:r>
-            <a:endParaRPr lang="de-DE" dirty="0"/>
-          </a:p>
-        </p:txBody>
-      </p:sp>
+              <a:t>Chat &amp; Message</a:t>
+            </a:r>
+          </a:p>
+        </p:txBody>
+      </p:sp>
+      <p:pic>
+        <p:nvPicPr>
+          <p:cNvPr id="12" name="Inhaltsplatzhalter 11" descr="Ein Bild, das Screenshot enthält.&#10;&#10;Automatisch generierte Beschreibung">
+            <a:extLst>
+              <a:ext uri="{FF2B5EF4-FFF2-40B4-BE49-F238E27FC236}">
+                <a16:creationId xmlns:a16="http://schemas.microsoft.com/office/drawing/2014/main" id="{44272838-579E-4B01-A5E4-4AD4895C3D24}"/>
+              </a:ext>
+            </a:extLst>
+          </p:cNvPr>
+          <p:cNvPicPr>
+            <a:picLocks noGrp="1" noChangeAspect="1"/>
+          </p:cNvPicPr>
+          <p:nvPr>
+            <p:ph idx="15"/>
+          </p:nvPr>
+        </p:nvPicPr>
+        <p:blipFill>
+          <a:blip r:embed="rId2"/>
+          <a:stretch>
+            <a:fillRect/>
+          </a:stretch>
+        </p:blipFill>
+        <p:spPr>
+          <a:xfrm>
+            <a:off x="4860663" y="2677119"/>
+            <a:ext cx="3753374" cy="2857899"/>
+          </a:xfrm>
+        </p:spPr>
+      </p:pic>
     </p:spTree>
     <p:extLst>
       <p:ext uri="{BB962C8B-B14F-4D97-AF65-F5344CB8AC3E}">
-        <p14:creationId xmlns:p14="http://schemas.microsoft.com/office/powerpoint/2010/main" val="2621557832"/>
+        <p14:creationId xmlns:p14="http://schemas.microsoft.com/office/powerpoint/2010/main" val="1120331300"/>
       </p:ext>
     </p:extLst>
   </p:cSld>
@@ -10183,10 +10166,10 @@
       </p:grpSpPr>
       <p:sp>
         <p:nvSpPr>
-          <p:cNvPr id="6" name="Inhaltsplatzhalter 5">
+          <p:cNvPr id="2" name="Inhaltsplatzhalter 1">
             <a:extLst>
               <a:ext uri="{FF2B5EF4-FFF2-40B4-BE49-F238E27FC236}">
-                <a16:creationId xmlns:a16="http://schemas.microsoft.com/office/drawing/2014/main" id="{BABB6F26-3E11-437C-9364-6A158AE67743}"/>
+                <a16:creationId xmlns:a16="http://schemas.microsoft.com/office/drawing/2014/main" id="{AE523D49-BDC2-429A-8195-E6EC189B30AA}"/>
               </a:ext>
             </a:extLst>
           </p:cNvPr>
@@ -10194,15 +10177,10 @@
             <a:spLocks noGrp="1"/>
           </p:cNvSpPr>
           <p:nvPr>
-            <p:ph idx="14"/>
-          </p:nvPr>
-        </p:nvSpPr>
-        <p:spPr>
-          <a:xfrm>
-            <a:off x="319090" y="2659310"/>
-            <a:ext cx="4180911" cy="3790257"/>
-          </a:xfrm>
-        </p:spPr>
+            <p:ph idx="1"/>
+          </p:nvPr>
+        </p:nvSpPr>
+        <p:spPr/>
         <p:txBody>
           <a:bodyPr/>
           <a:lstStyle/>
@@ -10212,22 +10190,13 @@
               <a:buChar char="•"/>
             </a:pPr>
             <a:r>
+              <a:rPr lang="de-DE" dirty="0" err="1"/>
+              <a:t>BaseX</a:t>
+            </a:r>
+            <a:r>
               <a:rPr lang="de-DE" dirty="0"/>
-              <a:t>Keine doppelten </a:t>
-            </a:r>
-            <a:r>
-              <a:rPr lang="de-DE" dirty="0" err="1"/>
-              <a:t>replaces</a:t>
-            </a:r>
-            <a:r>
-              <a:rPr lang="de-DE" dirty="0"/>
-              <a:t> in einem </a:t>
-            </a:r>
-            <a:r>
-              <a:rPr lang="de-DE" dirty="0" err="1"/>
-              <a:t>return</a:t>
-            </a:r>
-            <a:endParaRPr lang="de-DE" dirty="0"/>
+              <a:t> als Datenbank</a:t>
+            </a:r>
           </a:p>
           <a:p>
             <a:pPr marL="285750" indent="-285750">
@@ -10235,30 +10204,21 @@
               <a:buChar char="•"/>
             </a:pPr>
             <a:r>
+              <a:rPr lang="de-DE" dirty="0" err="1"/>
+              <a:t>XQuery</a:t>
+            </a:r>
+            <a:r>
               <a:rPr lang="de-DE" dirty="0"/>
-              <a:t>Letzter </a:t>
+              <a:t> als funktionale Sprache die </a:t>
             </a:r>
             <a:r>
               <a:rPr lang="de-DE" dirty="0" err="1"/>
-              <a:t>spieler</a:t>
+              <a:t>Queries</a:t>
             </a:r>
             <a:r>
               <a:rPr lang="de-DE" dirty="0"/>
-              <a:t> wählt </a:t>
-            </a:r>
-            <a:r>
-              <a:rPr lang="de-DE" dirty="0" err="1"/>
-              <a:t>hit</a:t>
-            </a:r>
-            <a:r>
-              <a:rPr lang="de-DE" dirty="0"/>
-              <a:t> und </a:t>
-            </a:r>
-            <a:r>
-              <a:rPr lang="de-DE" dirty="0" err="1"/>
-              <a:t>busted</a:t>
-            </a:r>
-            <a:endParaRPr lang="de-DE" dirty="0"/>
+              <a:t> auf XML Datenbanken ausführt</a:t>
+            </a:r>
           </a:p>
           <a:p>
             <a:pPr marL="285750" indent="-285750">
@@ -10267,7 +10227,7 @@
             </a:pPr>
             <a:r>
               <a:rPr lang="de-DE" dirty="0"/>
-              <a:t>Dealer zieht im selben Zug</a:t>
+              <a:t>Zeichnet sich durch FLOWR-Ausdrücke aus</a:t>
             </a:r>
           </a:p>
           <a:p>
@@ -10276,40 +10236,14 @@
               <a:buChar char="•"/>
             </a:pPr>
             <a:r>
+              <a:rPr lang="de-DE" dirty="0" err="1"/>
+              <a:t>XQuery</a:t>
+            </a:r>
+            <a:r>
               <a:rPr lang="de-DE" dirty="0"/>
-              <a:t>Lösung: Dealer zieht bevor den Spielern</a:t>
-            </a:r>
-          </a:p>
-          <a:p>
-            <a:endParaRPr lang="de-DE" dirty="0"/>
-          </a:p>
-        </p:txBody>
-      </p:sp>
-      <p:sp>
-        <p:nvSpPr>
-          <p:cNvPr id="7" name="Inhaltsplatzhalter 6">
-            <a:extLst>
-              <a:ext uri="{FF2B5EF4-FFF2-40B4-BE49-F238E27FC236}">
-                <a16:creationId xmlns:a16="http://schemas.microsoft.com/office/drawing/2014/main" id="{E38FA5CA-A50F-4A7A-8D5A-E4755333CAE4}"/>
-              </a:ext>
-            </a:extLst>
-          </p:cNvPr>
-          <p:cNvSpPr>
-            <a:spLocks noGrp="1"/>
-          </p:cNvSpPr>
-          <p:nvPr>
-            <p:ph idx="15"/>
-          </p:nvPr>
-        </p:nvSpPr>
-        <p:spPr>
-          <a:xfrm>
-            <a:off x="4644001" y="2659310"/>
-            <a:ext cx="4184087" cy="3790258"/>
-          </a:xfrm>
-        </p:spPr>
-        <p:txBody>
-          <a:bodyPr/>
-          <a:lstStyle/>
+              <a:t> selbst kann nur von Datenbank lesen</a:t>
+            </a:r>
+          </a:p>
           <a:p>
             <a:pPr marL="285750" indent="-285750">
               <a:buFont typeface="Arial" panose="020B0604020202020204" pitchFamily="34" charset="0"/>
@@ -10317,98 +10251,16 @@
             </a:pPr>
             <a:r>
               <a:rPr lang="de-DE" dirty="0"/>
-              <a:t>Updates von Elementen erst nach dem kompletten ausführen eines </a:t>
+              <a:t>Deswegen </a:t>
             </a:r>
             <a:r>
               <a:rPr lang="de-DE" dirty="0" err="1"/>
-              <a:t>return</a:t>
+              <a:t>XQuery</a:t>
             </a:r>
             <a:r>
               <a:rPr lang="de-DE" dirty="0"/>
-              <a:t> </a:t>
-            </a:r>
-            <a:r>
-              <a:rPr lang="de-DE" dirty="0" err="1"/>
-              <a:t>statement</a:t>
-            </a:r>
-            <a:r>
-              <a:rPr lang="de-DE" dirty="0"/>
-              <a:t> in der Datenbank</a:t>
-            </a:r>
-          </a:p>
-          <a:p>
-            <a:pPr marL="285750" indent="-285750">
-              <a:buFont typeface="Arial" panose="020B0604020202020204" pitchFamily="34" charset="0"/>
-              <a:buChar char="•"/>
-            </a:pPr>
-            <a:r>
-              <a:rPr lang="de-DE" dirty="0"/>
-              <a:t>Letzter Spieler </a:t>
-            </a:r>
-            <a:r>
-              <a:rPr lang="de-DE" dirty="0" err="1"/>
-              <a:t>doublet</a:t>
-            </a:r>
-            <a:r>
-              <a:rPr lang="de-DE" dirty="0"/>
-              <a:t> oder </a:t>
-            </a:r>
-            <a:r>
-              <a:rPr lang="de-DE" dirty="0" err="1"/>
-              <a:t>busted</a:t>
-            </a:r>
-            <a:endParaRPr lang="de-DE" dirty="0"/>
-          </a:p>
-          <a:p>
-            <a:pPr marL="285750" indent="-285750">
-              <a:buFont typeface="Arial" panose="020B0604020202020204" pitchFamily="34" charset="0"/>
-              <a:buChar char="•"/>
-            </a:pPr>
-            <a:r>
-              <a:rPr lang="de-DE" dirty="0"/>
-              <a:t>Seine Hand noch nicht aktualisiert aber </a:t>
-            </a:r>
-            <a:r>
-              <a:rPr lang="de-DE" dirty="0" err="1"/>
-              <a:t>evaluate</a:t>
-            </a:r>
-            <a:r>
-              <a:rPr lang="de-DE" dirty="0"/>
-              <a:t> wird schon aufgerufen</a:t>
-            </a:r>
-          </a:p>
-          <a:p>
-            <a:pPr marL="285750" indent="-285750">
-              <a:buFont typeface="Arial" panose="020B0604020202020204" pitchFamily="34" charset="0"/>
-              <a:buChar char="•"/>
-            </a:pPr>
-            <a:r>
-              <a:rPr lang="de-DE" dirty="0"/>
-              <a:t>Lösung: Beim Aufrufen von </a:t>
-            </a:r>
-            <a:r>
-              <a:rPr lang="de-DE" dirty="0" err="1"/>
-              <a:t>evaluate</a:t>
-            </a:r>
-            <a:r>
-              <a:rPr lang="de-DE" dirty="0"/>
-              <a:t> mitteilen was die letzte Aktion war und in </a:t>
-            </a:r>
-            <a:r>
-              <a:rPr lang="de-DE" dirty="0" err="1"/>
-              <a:t>evaluate</a:t>
-            </a:r>
-            <a:r>
-              <a:rPr lang="de-DE" dirty="0"/>
-              <a:t> beachten</a:t>
-            </a:r>
-          </a:p>
-          <a:p>
-            <a:pPr marL="285750" indent="-285750">
-              <a:buFont typeface="Arial" panose="020B0604020202020204" pitchFamily="34" charset="0"/>
-              <a:buChar char="•"/>
-            </a:pPr>
-            <a:endParaRPr lang="de-DE" dirty="0"/>
+              <a:t> Update Facility</a:t>
+            </a:r>
           </a:p>
         </p:txBody>
       </p:sp>
@@ -10417,7 +10269,7 @@
           <p:cNvPr id="3" name="Foliennummernplatzhalter 2">
             <a:extLst>
               <a:ext uri="{FF2B5EF4-FFF2-40B4-BE49-F238E27FC236}">
-                <a16:creationId xmlns:a16="http://schemas.microsoft.com/office/drawing/2014/main" id="{53BD56A1-3671-4214-B9B1-D1396FC17C8B}"/>
+                <a16:creationId xmlns:a16="http://schemas.microsoft.com/office/drawing/2014/main" id="{31772658-6DB8-4140-BDD4-05D879326A72}"/>
               </a:ext>
             </a:extLst>
           </p:cNvPr>
@@ -10425,7 +10277,7 @@
             <a:spLocks noGrp="1"/>
           </p:cNvSpPr>
           <p:nvPr>
-            <p:ph type="sldNum" sz="quarter" idx="16"/>
+            <p:ph type="sldNum" sz="quarter" idx="11"/>
           </p:nvPr>
         </p:nvSpPr>
         <p:spPr/>
@@ -10447,7 +10299,7 @@
           <p:cNvPr id="4" name="Fußzeilenplatzhalter 3">
             <a:extLst>
               <a:ext uri="{FF2B5EF4-FFF2-40B4-BE49-F238E27FC236}">
-                <a16:creationId xmlns:a16="http://schemas.microsoft.com/office/drawing/2014/main" id="{C56C636A-F879-429E-9888-BCDD840DB93B}"/>
+                <a16:creationId xmlns:a16="http://schemas.microsoft.com/office/drawing/2014/main" id="{0F5FC549-12A2-49EA-94CD-7CA8F667B81C}"/>
               </a:ext>
             </a:extLst>
           </p:cNvPr>
@@ -10455,7 +10307,7 @@
             <a:spLocks noGrp="1"/>
           </p:cNvSpPr>
           <p:nvPr>
-            <p:ph type="ftr" sz="quarter" idx="17"/>
+            <p:ph type="ftr" sz="quarter" idx="12"/>
           </p:nvPr>
         </p:nvSpPr>
         <p:spPr/>
@@ -10476,7 +10328,7 @@
           <p:cNvPr id="5" name="Titel 4">
             <a:extLst>
               <a:ext uri="{FF2B5EF4-FFF2-40B4-BE49-F238E27FC236}">
-                <a16:creationId xmlns:a16="http://schemas.microsoft.com/office/drawing/2014/main" id="{5329FADE-F83D-4549-B9ED-F031FFA9B2D1}"/>
+                <a16:creationId xmlns:a16="http://schemas.microsoft.com/office/drawing/2014/main" id="{BBD62AF3-48A3-446F-8E3B-3F9602C3602A}"/>
               </a:ext>
             </a:extLst>
           </p:cNvPr>
@@ -10494,92 +10346,24 @@
           <a:p>
             <a:r>
               <a:rPr lang="de-DE" dirty="0" err="1"/>
-              <a:t>XQuery</a:t>
+              <a:t>Xquery</a:t>
             </a:r>
             <a:r>
               <a:rPr lang="de-DE" dirty="0"/>
-              <a:t> Update Facility</a:t>
-            </a:r>
-          </a:p>
-        </p:txBody>
-      </p:sp>
-      <p:sp>
-        <p:nvSpPr>
-          <p:cNvPr id="9" name="Textfeld 8">
-            <a:extLst>
-              <a:ext uri="{FF2B5EF4-FFF2-40B4-BE49-F238E27FC236}">
-                <a16:creationId xmlns:a16="http://schemas.microsoft.com/office/drawing/2014/main" id="{847C34C0-8C57-46B9-A708-10ED106F9623}"/>
-              </a:ext>
-            </a:extLst>
-          </p:cNvPr>
-          <p:cNvSpPr txBox="1"/>
-          <p:nvPr/>
-        </p:nvSpPr>
-        <p:spPr>
-          <a:xfrm>
-            <a:off x="595618" y="1652631"/>
-            <a:ext cx="5958362" cy="537968"/>
-          </a:xfrm>
-          <a:prstGeom prst="rect">
-            <a:avLst/>
-          </a:prstGeom>
-          <a:noFill/>
-        </p:spPr>
-        <p:txBody>
-          <a:bodyPr wrap="none" lIns="0" tIns="0" rIns="0" bIns="0" rtlCol="0">
-            <a:spAutoFit/>
-          </a:bodyPr>
-          <a:lstStyle/>
-          <a:p>
-            <a:pPr>
-              <a:lnSpc>
-                <a:spcPct val="114000"/>
-              </a:lnSpc>
-            </a:pPr>
-            <a:r>
-              <a:rPr lang="de-DE" sz="1600" dirty="0">
-                <a:latin typeface="+mn-lt"/>
-              </a:rPr>
-              <a:t>Ziel: angenehmes Spielgefühl mit wenig User </a:t>
-            </a:r>
-            <a:r>
-              <a:rPr lang="de-DE" sz="1600" dirty="0" err="1">
-                <a:latin typeface="+mn-lt"/>
-              </a:rPr>
-              <a:t>input</a:t>
-            </a:r>
-            <a:r>
-              <a:rPr lang="de-DE" sz="1600" dirty="0">
-                <a:latin typeface="+mn-lt"/>
-              </a:rPr>
-              <a:t> -&gt;</a:t>
-            </a:r>
-          </a:p>
-          <a:p>
-            <a:pPr>
-              <a:lnSpc>
-                <a:spcPct val="114000"/>
-              </a:lnSpc>
-            </a:pPr>
-            <a:r>
-              <a:rPr lang="de-DE" sz="1600" dirty="0" err="1">
-                <a:latin typeface="+mn-lt"/>
-              </a:rPr>
-              <a:t>Bust</a:t>
-            </a:r>
-            <a:r>
-              <a:rPr lang="de-DE" sz="1600" dirty="0">
-                <a:latin typeface="+mn-lt"/>
-              </a:rPr>
-              <a:t> und Double beenden automatisch den Spielzug des Spielers</a:t>
-            </a:r>
+              <a:t> &amp; </a:t>
+            </a:r>
+            <a:r>
+              <a:rPr lang="de-DE" dirty="0" err="1"/>
+              <a:t>BaseX</a:t>
+            </a:r>
+            <a:endParaRPr lang="de-DE" dirty="0"/>
           </a:p>
         </p:txBody>
       </p:sp>
     </p:spTree>
     <p:extLst>
       <p:ext uri="{BB962C8B-B14F-4D97-AF65-F5344CB8AC3E}">
-        <p14:creationId xmlns:p14="http://schemas.microsoft.com/office/powerpoint/2010/main" val="3888416019"/>
+        <p14:creationId xmlns:p14="http://schemas.microsoft.com/office/powerpoint/2010/main" val="2621557832"/>
       </p:ext>
     </p:extLst>
   </p:cSld>
@@ -10608,65 +10392,249 @@
       </p:grpSpPr>
       <p:sp>
         <p:nvSpPr>
-          <p:cNvPr id="2" name="Inhaltsplatzhalter 1"/>
-          <p:cNvSpPr>
-            <a:spLocks noGrp="1"/>
-          </p:cNvSpPr>
-          <p:nvPr>
-            <p:ph idx="1"/>
-          </p:nvPr>
-        </p:nvSpPr>
-        <p:spPr/>
+          <p:cNvPr id="6" name="Inhaltsplatzhalter 5">
+            <a:extLst>
+              <a:ext uri="{FF2B5EF4-FFF2-40B4-BE49-F238E27FC236}">
+                <a16:creationId xmlns:a16="http://schemas.microsoft.com/office/drawing/2014/main" id="{BABB6F26-3E11-437C-9364-6A158AE67743}"/>
+              </a:ext>
+            </a:extLst>
+          </p:cNvPr>
+          <p:cNvSpPr>
+            <a:spLocks noGrp="1"/>
+          </p:cNvSpPr>
+          <p:nvPr>
+            <p:ph idx="14"/>
+          </p:nvPr>
+        </p:nvSpPr>
+        <p:spPr>
+          <a:xfrm>
+            <a:off x="319090" y="2659310"/>
+            <a:ext cx="4180911" cy="3790257"/>
+          </a:xfrm>
+        </p:spPr>
         <p:txBody>
           <a:bodyPr/>
           <a:lstStyle/>
           <a:p>
-            <a:r>
-              <a:rPr dirty="0" err="1"/>
-              <a:t>Dieser</a:t>
-            </a:r>
-            <a:r>
-              <a:rPr dirty="0"/>
-              <a:t> Folienmaster gilt bei offiziellen Präsentationen im Rahmen der TUM.</a:t>
-            </a:r>
-            <a:br>
-              <a:rPr dirty="0"/>
-            </a:br>
-            <a:r>
-              <a:rPr dirty="0"/>
-              <a:t>Es ist darauf zu achten, dass wir uns in einem durchgängigen Layout </a:t>
-            </a:r>
-            <a:r>
-              <a:rPr dirty="0" err="1"/>
-              <a:t>präsentieren</a:t>
-            </a:r>
-            <a:r>
-              <a:rPr dirty="0"/>
-              <a:t>.</a:t>
-            </a:r>
-          </a:p>
-          <a:p>
+            <a:pPr marL="285750" indent="-285750">
+              <a:buFont typeface="Arial" panose="020B0604020202020204" pitchFamily="34" charset="0"/>
+              <a:buChar char="•"/>
+            </a:pPr>
             <a:r>
               <a:rPr lang="de-DE" dirty="0"/>
-              <a:t>Abweichungen vom vorgegebenen Layout bitte auf ein Minimum reduzieren.</a:t>
-            </a:r>
-          </a:p>
-          <a:p>
-            <a:endParaRPr dirty="0"/>
-          </a:p>
-          <a:p>
-            <a:endParaRPr sz="2200" dirty="0"/>
-          </a:p>
-        </p:txBody>
-      </p:sp>
-      <p:sp>
-        <p:nvSpPr>
-          <p:cNvPr id="4" name="Foliennummernplatzhalter 3"/>
-          <p:cNvSpPr>
-            <a:spLocks noGrp="1"/>
-          </p:cNvSpPr>
-          <p:nvPr>
-            <p:ph type="sldNum" sz="quarter" idx="11"/>
+              <a:t>Keine doppelten </a:t>
+            </a:r>
+            <a:r>
+              <a:rPr lang="de-DE" dirty="0" err="1"/>
+              <a:t>replaces</a:t>
+            </a:r>
+            <a:r>
+              <a:rPr lang="de-DE" dirty="0"/>
+              <a:t> in einem </a:t>
+            </a:r>
+            <a:r>
+              <a:rPr lang="de-DE" dirty="0" err="1"/>
+              <a:t>return</a:t>
+            </a:r>
+            <a:endParaRPr lang="de-DE" dirty="0"/>
+          </a:p>
+          <a:p>
+            <a:pPr marL="285750" indent="-285750">
+              <a:buFont typeface="Arial" panose="020B0604020202020204" pitchFamily="34" charset="0"/>
+              <a:buChar char="•"/>
+            </a:pPr>
+            <a:r>
+              <a:rPr lang="de-DE" dirty="0"/>
+              <a:t>Letzter </a:t>
+            </a:r>
+            <a:r>
+              <a:rPr lang="de-DE" dirty="0" err="1"/>
+              <a:t>spieler</a:t>
+            </a:r>
+            <a:r>
+              <a:rPr lang="de-DE" dirty="0"/>
+              <a:t> wählt </a:t>
+            </a:r>
+            <a:r>
+              <a:rPr lang="de-DE" dirty="0" err="1"/>
+              <a:t>hit</a:t>
+            </a:r>
+            <a:r>
+              <a:rPr lang="de-DE" dirty="0"/>
+              <a:t> und </a:t>
+            </a:r>
+            <a:r>
+              <a:rPr lang="de-DE" dirty="0" err="1"/>
+              <a:t>busted</a:t>
+            </a:r>
+            <a:endParaRPr lang="de-DE" dirty="0"/>
+          </a:p>
+          <a:p>
+            <a:pPr marL="285750" indent="-285750">
+              <a:buFont typeface="Arial" panose="020B0604020202020204" pitchFamily="34" charset="0"/>
+              <a:buChar char="•"/>
+            </a:pPr>
+            <a:r>
+              <a:rPr lang="de-DE" dirty="0"/>
+              <a:t>Dealer zieht im selben Zug</a:t>
+            </a:r>
+          </a:p>
+          <a:p>
+            <a:pPr marL="285750" indent="-285750">
+              <a:buFont typeface="Arial" panose="020B0604020202020204" pitchFamily="34" charset="0"/>
+              <a:buChar char="•"/>
+            </a:pPr>
+            <a:r>
+              <a:rPr lang="de-DE" dirty="0"/>
+              <a:t>Lösung: Dealer zieht bevor den Spielern</a:t>
+            </a:r>
+          </a:p>
+          <a:p>
+            <a:endParaRPr lang="de-DE" dirty="0"/>
+          </a:p>
+        </p:txBody>
+      </p:sp>
+      <p:sp>
+        <p:nvSpPr>
+          <p:cNvPr id="7" name="Inhaltsplatzhalter 6">
+            <a:extLst>
+              <a:ext uri="{FF2B5EF4-FFF2-40B4-BE49-F238E27FC236}">
+                <a16:creationId xmlns:a16="http://schemas.microsoft.com/office/drawing/2014/main" id="{E38FA5CA-A50F-4A7A-8D5A-E4755333CAE4}"/>
+              </a:ext>
+            </a:extLst>
+          </p:cNvPr>
+          <p:cNvSpPr>
+            <a:spLocks noGrp="1"/>
+          </p:cNvSpPr>
+          <p:nvPr>
+            <p:ph idx="15"/>
+          </p:nvPr>
+        </p:nvSpPr>
+        <p:spPr>
+          <a:xfrm>
+            <a:off x="4644001" y="2659310"/>
+            <a:ext cx="4184087" cy="3790258"/>
+          </a:xfrm>
+        </p:spPr>
+        <p:txBody>
+          <a:bodyPr/>
+          <a:lstStyle/>
+          <a:p>
+            <a:pPr marL="285750" indent="-285750">
+              <a:buFont typeface="Arial" panose="020B0604020202020204" pitchFamily="34" charset="0"/>
+              <a:buChar char="•"/>
+            </a:pPr>
+            <a:r>
+              <a:rPr lang="de-DE" dirty="0"/>
+              <a:t>Updates von Elementen erst nach dem kompletten ausführen eines </a:t>
+            </a:r>
+            <a:r>
+              <a:rPr lang="de-DE" dirty="0" err="1"/>
+              <a:t>return</a:t>
+            </a:r>
+            <a:r>
+              <a:rPr lang="de-DE" dirty="0"/>
+              <a:t> </a:t>
+            </a:r>
+            <a:r>
+              <a:rPr lang="de-DE" dirty="0" err="1"/>
+              <a:t>statement</a:t>
+            </a:r>
+            <a:r>
+              <a:rPr lang="de-DE" dirty="0"/>
+              <a:t> in der Datenbank</a:t>
+            </a:r>
+          </a:p>
+          <a:p>
+            <a:pPr marL="285750" indent="-285750">
+              <a:buFont typeface="Arial" panose="020B0604020202020204" pitchFamily="34" charset="0"/>
+              <a:buChar char="•"/>
+            </a:pPr>
+            <a:r>
+              <a:rPr lang="de-DE" dirty="0"/>
+              <a:t>Letzter Spieler </a:t>
+            </a:r>
+            <a:r>
+              <a:rPr lang="de-DE" dirty="0" err="1"/>
+              <a:t>doubled</a:t>
+            </a:r>
+            <a:r>
+              <a:rPr lang="de-DE" dirty="0"/>
+              <a:t> oder </a:t>
+            </a:r>
+            <a:r>
+              <a:rPr lang="de-DE" dirty="0" err="1"/>
+              <a:t>busted</a:t>
+            </a:r>
+            <a:endParaRPr lang="de-DE" dirty="0"/>
+          </a:p>
+          <a:p>
+            <a:pPr marL="285750" indent="-285750">
+              <a:buFont typeface="Arial" panose="020B0604020202020204" pitchFamily="34" charset="0"/>
+              <a:buChar char="•"/>
+            </a:pPr>
+            <a:r>
+              <a:rPr lang="de-DE" dirty="0"/>
+              <a:t>Seine Hand noch nicht aktualisiert aber </a:t>
+            </a:r>
+            <a:r>
+              <a:rPr lang="de-DE" dirty="0" err="1"/>
+              <a:t>evaluate</a:t>
+            </a:r>
+            <a:r>
+              <a:rPr lang="de-DE" dirty="0"/>
+              <a:t> wird schon aufgerufen</a:t>
+            </a:r>
+          </a:p>
+          <a:p>
+            <a:pPr marL="285750" indent="-285750">
+              <a:buFont typeface="Arial" panose="020B0604020202020204" pitchFamily="34" charset="0"/>
+              <a:buChar char="•"/>
+            </a:pPr>
+            <a:r>
+              <a:rPr lang="de-DE" dirty="0"/>
+              <a:t>Lösung: Beim Aufrufen von </a:t>
+            </a:r>
+            <a:r>
+              <a:rPr lang="de-DE" dirty="0" err="1"/>
+              <a:t>evaluate</a:t>
+            </a:r>
+            <a:r>
+              <a:rPr lang="de-DE" dirty="0"/>
+              <a:t> mitteilen was die letzte Aktion war und in </a:t>
+            </a:r>
+            <a:r>
+              <a:rPr lang="de-DE" dirty="0" err="1"/>
+              <a:t>evaluate</a:t>
+            </a:r>
+            <a:r>
+              <a:rPr lang="de-DE" dirty="0"/>
+              <a:t> beachten</a:t>
+            </a:r>
+          </a:p>
+          <a:p>
+            <a:pPr marL="285750" indent="-285750">
+              <a:buFont typeface="Arial" panose="020B0604020202020204" pitchFamily="34" charset="0"/>
+              <a:buChar char="•"/>
+            </a:pPr>
+            <a:endParaRPr lang="de-DE" dirty="0"/>
+          </a:p>
+        </p:txBody>
+      </p:sp>
+      <p:sp>
+        <p:nvSpPr>
+          <p:cNvPr id="3" name="Foliennummernplatzhalter 2">
+            <a:extLst>
+              <a:ext uri="{FF2B5EF4-FFF2-40B4-BE49-F238E27FC236}">
+                <a16:creationId xmlns:a16="http://schemas.microsoft.com/office/drawing/2014/main" id="{53BD56A1-3671-4214-B9B1-D1396FC17C8B}"/>
+              </a:ext>
+            </a:extLst>
+          </p:cNvPr>
+          <p:cNvSpPr>
+            <a:spLocks noGrp="1"/>
+          </p:cNvSpPr>
+          <p:nvPr>
+            <p:ph type="sldNum" sz="quarter" idx="16"/>
           </p:nvPr>
         </p:nvSpPr>
         <p:spPr/>
@@ -10685,12 +10653,18 @@
       </p:sp>
       <p:sp>
         <p:nvSpPr>
-          <p:cNvPr id="7" name="Fußzeilenplatzhalter 4"/>
-          <p:cNvSpPr>
-            <a:spLocks noGrp="1"/>
-          </p:cNvSpPr>
-          <p:nvPr>
-            <p:ph type="ftr" sz="quarter" idx="12"/>
+          <p:cNvPr id="4" name="Fußzeilenplatzhalter 3">
+            <a:extLst>
+              <a:ext uri="{FF2B5EF4-FFF2-40B4-BE49-F238E27FC236}">
+                <a16:creationId xmlns:a16="http://schemas.microsoft.com/office/drawing/2014/main" id="{C56C636A-F879-429E-9888-BCDD840DB93B}"/>
+              </a:ext>
+            </a:extLst>
+          </p:cNvPr>
+          <p:cNvSpPr>
+            <a:spLocks noGrp="1"/>
+          </p:cNvSpPr>
+          <p:nvPr>
+            <p:ph type="ftr" sz="quarter" idx="17"/>
           </p:nvPr>
         </p:nvSpPr>
         <p:spPr/>
@@ -10708,7 +10682,13 @@
       </p:sp>
       <p:sp>
         <p:nvSpPr>
-          <p:cNvPr id="3" name="Titel 2"/>
+          <p:cNvPr id="5" name="Titel 4">
+            <a:extLst>
+              <a:ext uri="{FF2B5EF4-FFF2-40B4-BE49-F238E27FC236}">
+                <a16:creationId xmlns:a16="http://schemas.microsoft.com/office/drawing/2014/main" id="{5329FADE-F83D-4549-B9ED-F031FFA9B2D1}"/>
+              </a:ext>
+            </a:extLst>
+          </p:cNvPr>
           <p:cNvSpPr>
             <a:spLocks noGrp="1"/>
           </p:cNvSpPr>
@@ -10716,24 +10696,101 @@
             <p:ph type="title"/>
           </p:nvPr>
         </p:nvSpPr>
+        <p:spPr/>
+        <p:txBody>
+          <a:bodyPr/>
+          <a:lstStyle/>
+          <a:p>
+            <a:r>
+              <a:rPr lang="de-DE" dirty="0" err="1"/>
+              <a:t>XQuery</a:t>
+            </a:r>
+            <a:r>
+              <a:rPr lang="de-DE" dirty="0"/>
+              <a:t> Update Facility</a:t>
+            </a:r>
+          </a:p>
+        </p:txBody>
+      </p:sp>
+      <p:sp>
+        <p:nvSpPr>
+          <p:cNvPr id="9" name="Textfeld 8">
+            <a:extLst>
+              <a:ext uri="{FF2B5EF4-FFF2-40B4-BE49-F238E27FC236}">
+                <a16:creationId xmlns:a16="http://schemas.microsoft.com/office/drawing/2014/main" id="{847C34C0-8C57-46B9-A708-10ED106F9623}"/>
+              </a:ext>
+            </a:extLst>
+          </p:cNvPr>
+          <p:cNvSpPr txBox="1"/>
+          <p:nvPr/>
+        </p:nvSpPr>
         <p:spPr>
+          <a:xfrm>
+            <a:off x="595618" y="1652631"/>
+            <a:ext cx="5958362" cy="537968"/>
+          </a:xfrm>
           <a:prstGeom prst="rect">
             <a:avLst/>
           </a:prstGeom>
+          <a:noFill/>
         </p:spPr>
         <p:txBody>
-          <a:bodyPr/>
+          <a:bodyPr wrap="none" lIns="0" tIns="0" rIns="0" bIns="0" rtlCol="0">
+            <a:spAutoFit/>
+          </a:bodyPr>
           <a:lstStyle/>
           <a:p>
-            <a:r>
-              <a:rPr sz="3000" dirty="0"/>
-              <a:t>Gültigkeit der Masterfolien</a:t>
-            </a:r>
-            <a:endParaRPr lang="de-DE" sz="3000" dirty="0"/>
+            <a:pPr>
+              <a:lnSpc>
+                <a:spcPct val="114000"/>
+              </a:lnSpc>
+            </a:pPr>
+            <a:r>
+              <a:rPr lang="de-DE" sz="1600" dirty="0">
+                <a:latin typeface="+mn-lt"/>
+              </a:rPr>
+              <a:t>Ziel: angenehmes Spielgefühl mit wenig User </a:t>
+            </a:r>
+            <a:r>
+              <a:rPr lang="de-DE" sz="1600" dirty="0" err="1">
+                <a:latin typeface="+mn-lt"/>
+              </a:rPr>
+              <a:t>input</a:t>
+            </a:r>
+            <a:r>
+              <a:rPr lang="de-DE" sz="1600" dirty="0">
+                <a:latin typeface="+mn-lt"/>
+              </a:rPr>
+              <a:t> -&gt;</a:t>
+            </a:r>
+          </a:p>
+          <a:p>
+            <a:pPr>
+              <a:lnSpc>
+                <a:spcPct val="114000"/>
+              </a:lnSpc>
+            </a:pPr>
+            <a:r>
+              <a:rPr lang="de-DE" sz="1600" dirty="0" err="1">
+                <a:latin typeface="+mn-lt"/>
+              </a:rPr>
+              <a:t>Bust</a:t>
+            </a:r>
+            <a:r>
+              <a:rPr lang="de-DE" sz="1600" dirty="0">
+                <a:latin typeface="+mn-lt"/>
+              </a:rPr>
+              <a:t> und Double beenden automatisch den Spielzug des Spielers</a:t>
+            </a:r>
           </a:p>
         </p:txBody>
       </p:sp>
     </p:spTree>
+    <p:extLst>
+      <p:ext uri="{BB962C8B-B14F-4D97-AF65-F5344CB8AC3E}">
+        <p14:creationId xmlns:p14="http://schemas.microsoft.com/office/powerpoint/2010/main" val="3888416019"/>
+      </p:ext>
+    </p:extLst>
   </p:cSld>
   <p:clrMapOvr>
     <a:masterClrMapping/>
@@ -10774,16 +10831,40 @@
           <a:lstStyle/>
           <a:p>
             <a:r>
+              <a:rPr dirty="0" err="1"/>
+              <a:t>Dieser</a:t>
+            </a:r>
+            <a:r>
               <a:rPr dirty="0"/>
-              <a:t>Als Grundlage dient der Corporate Design Style Guide der TUM.</a:t>
+              <a:t> Folienmaster gilt bei offiziellen Präsentationen im Rahmen der TUM.</a:t>
             </a:r>
             <a:br>
               <a:rPr dirty="0"/>
             </a:br>
             <a:r>
               <a:rPr dirty="0"/>
-              <a:t>Die Präsentationsvorlage ist auf gute Lesbarkeit und klare Darstellung von Informationen optimiert.</a:t>
-            </a:r>
+              <a:t>Es ist darauf zu achten, dass wir uns in einem durchgängigen Layout </a:t>
+            </a:r>
+            <a:r>
+              <a:rPr dirty="0" err="1"/>
+              <a:t>präsentieren</a:t>
+            </a:r>
+            <a:r>
+              <a:rPr dirty="0"/>
+              <a:t>.</a:t>
+            </a:r>
+          </a:p>
+          <a:p>
+            <a:r>
+              <a:rPr lang="de-DE" dirty="0"/>
+              <a:t>Abweichungen vom vorgegebenen Layout bitte auf ein Minimum reduzieren.</a:t>
+            </a:r>
+          </a:p>
+          <a:p>
+            <a:endParaRPr dirty="0"/>
+          </a:p>
+          <a:p>
+            <a:endParaRPr sz="2200" dirty="0"/>
           </a:p>
         </p:txBody>
       </p:sp>
@@ -10813,7 +10894,7 @@
       </p:sp>
       <p:sp>
         <p:nvSpPr>
-          <p:cNvPr id="6" name="Fußzeilenplatzhalter 4"/>
+          <p:cNvPr id="7" name="Fußzeilenplatzhalter 4"/>
           <p:cNvSpPr>
             <a:spLocks noGrp="1"/>
           </p:cNvSpPr>
@@ -10855,7 +10936,7 @@
           <a:p>
             <a:r>
               <a:rPr sz="3000" dirty="0"/>
-              <a:t>Grundlage der Masterfolien</a:t>
+              <a:t>Gültigkeit der Masterfolien</a:t>
             </a:r>
             <a:endParaRPr lang="de-DE" sz="3000" dirty="0"/>
           </a:p>
@@ -10896,12 +10977,7 @@
             <p:ph idx="1"/>
           </p:nvPr>
         </p:nvSpPr>
-        <p:spPr>
-          <a:xfrm>
-            <a:off x="319090" y="2105024"/>
-            <a:ext cx="8508999" cy="4356735"/>
-          </a:xfrm>
-        </p:spPr>
+        <p:spPr/>
         <p:txBody>
           <a:bodyPr/>
           <a:lstStyle/>
@@ -10978,10 +11054,6 @@
           </p:nvPr>
         </p:nvSpPr>
         <p:spPr>
-          <a:xfrm>
-            <a:off x="319090" y="994334"/>
-            <a:ext cx="8508999" cy="820738"/>
-          </a:xfrm>
           <a:prstGeom prst="rect">
             <a:avLst/>
           </a:prstGeom>
@@ -10991,16 +11063,10 @@
           <a:lstStyle/>
           <a:p>
             <a:r>
-              <a:rPr lang="de-DE" dirty="0"/>
-              <a:t>Hier steht eine Überschrift</a:t>
-            </a:r>
-            <a:br>
-              <a:rPr lang="de-DE" dirty="0"/>
-            </a:br>
-            <a:r>
-              <a:rPr lang="de-DE" dirty="0"/>
-              <a:t>max. 2-zeilig</a:t>
-            </a:r>
+              <a:rPr sz="3000" dirty="0"/>
+              <a:t>Grundlage der Masterfolien</a:t>
+            </a:r>
+            <a:endParaRPr lang="de-DE" sz="3000" dirty="0"/>
           </a:p>
         </p:txBody>
       </p:sp>
@@ -11039,106 +11105,26 @@
             <p:ph idx="1"/>
           </p:nvPr>
         </p:nvSpPr>
-        <p:spPr/>
+        <p:spPr>
+          <a:xfrm>
+            <a:off x="319090" y="2105024"/>
+            <a:ext cx="8508999" cy="4356735"/>
+          </a:xfrm>
+        </p:spPr>
         <p:txBody>
           <a:bodyPr/>
           <a:lstStyle/>
           <a:p>
             <a:r>
               <a:rPr dirty="0"/>
-              <a:t>Das Grundprinzip ist, Informationen bestmöglich zu transportieren. Dazu muss vor allem die Schrift einheitlich und für alle im Raum lesbar sein. </a:t>
-            </a:r>
-          </a:p>
-          <a:p>
-            <a:endParaRPr dirty="0"/>
-          </a:p>
-          <a:p>
-            <a:r>
-              <a:rPr dirty="0" err="1"/>
-              <a:t>Schriftart</a:t>
-            </a:r>
-            <a:r>
+              <a:t>Als Grundlage dient der Corporate Design Style Guide der TUM.</a:t>
+            </a:r>
+            <a:br>
               <a:rPr dirty="0"/>
-              <a:t>: Arial</a:t>
-            </a:r>
-          </a:p>
-          <a:p>
-            <a:endParaRPr dirty="0"/>
-          </a:p>
-          <a:p>
-            <a:r>
-              <a:rPr dirty="0" err="1"/>
-              <a:t>Schriftgr</a:t>
-            </a:r>
-            <a:r>
-              <a:rPr lang="de-DE" dirty="0" err="1"/>
-              <a:t>ößen</a:t>
-            </a:r>
+            </a:br>
             <a:r>
               <a:rPr dirty="0"/>
-              <a:t>:</a:t>
-            </a:r>
-            <a:r>
-              <a:rPr lang="de-DE" dirty="0"/>
-              <a:t>30 | 22 | 16 | 12</a:t>
-            </a:r>
-            <a:endParaRPr dirty="0"/>
-          </a:p>
-          <a:p>
-            <a:endParaRPr dirty="0"/>
-          </a:p>
-          <a:p>
-            <a:r>
-              <a:rPr dirty="0" err="1"/>
-              <a:t>Zeilenabstand</a:t>
-            </a:r>
-            <a:r>
-              <a:rPr dirty="0"/>
-              <a:t>: 1,15mm</a:t>
-            </a:r>
-          </a:p>
-          <a:p>
-            <a:endParaRPr dirty="0"/>
-          </a:p>
-          <a:p>
-            <a:r>
-              <a:rPr dirty="0"/>
-              <a:t>Die Einstellungen sind in den Textfeldern und Textfeldvorlagen dieses ppt-Masters als Standard eingestellt. Bei Diagrammen und Tabellen muss die Schriftgröße ggf. angepasst werden.</a:t>
-            </a:r>
-            <a:r>
-              <a:rPr lang="de-DE" dirty="0"/>
-              <a:t> Für Auszeichnungen im Fließtext kann auch </a:t>
-            </a:r>
-            <a:r>
-              <a:rPr lang="de-DE" b="1" dirty="0"/>
-              <a:t>fett </a:t>
-            </a:r>
-            <a:r>
-              <a:rPr lang="de-DE" dirty="0"/>
-              <a:t>markiert werden.</a:t>
-            </a:r>
-            <a:endParaRPr dirty="0"/>
-          </a:p>
-          <a:p>
-            <a:r>
-              <a:rPr dirty="0"/>
-              <a:t>Bei großer Distanz bzw. </a:t>
-            </a:r>
-            <a:r>
-              <a:rPr dirty="0" err="1"/>
-              <a:t>kleinem</a:t>
-            </a:r>
-            <a:r>
-              <a:rPr dirty="0"/>
-              <a:t> </a:t>
-            </a:r>
-            <a:r>
-              <a:rPr dirty="0" err="1"/>
-              <a:t>Präsentationsmedium</a:t>
-            </a:r>
-            <a:r>
-              <a:rPr dirty="0"/>
-              <a:t> kann der Schriftgrad notfalls proportional erhöht werden.</a:t>
+              <a:t>Die Präsentationsvorlage ist auf gute Lesbarkeit und klare Darstellung von Informationen optimiert.</a:t>
             </a:r>
           </a:p>
         </p:txBody>
@@ -11153,11 +11139,7 @@
             <p:ph type="sldNum" sz="quarter" idx="11"/>
           </p:nvPr>
         </p:nvSpPr>
-        <p:spPr>
-          <a:prstGeom prst="rect">
-            <a:avLst/>
-          </a:prstGeom>
-        </p:spPr>
+        <p:spPr/>
         <p:txBody>
           <a:bodyPr/>
           <a:lstStyle/>
@@ -11205,6 +11187,10 @@
           </p:nvPr>
         </p:nvSpPr>
         <p:spPr>
+          <a:xfrm>
+            <a:off x="319090" y="994334"/>
+            <a:ext cx="8508999" cy="820738"/>
+          </a:xfrm>
           <a:prstGeom prst="rect">
             <a:avLst/>
           </a:prstGeom>
@@ -11214,10 +11200,16 @@
           <a:lstStyle/>
           <a:p>
             <a:r>
-              <a:rPr sz="3000" dirty="0"/>
-              <a:t>Schrift</a:t>
-            </a:r>
-            <a:endParaRPr lang="de-DE" sz="3000" dirty="0"/>
+              <a:rPr lang="de-DE" dirty="0"/>
+              <a:t>Hier steht eine Überschrift</a:t>
+            </a:r>
+            <a:br>
+              <a:rPr lang="de-DE" dirty="0"/>
+            </a:br>
+            <a:r>
+              <a:rPr lang="de-DE" dirty="0"/>
+              <a:t>max. 2-zeilig</a:t>
+            </a:r>
           </a:p>
         </p:txBody>
       </p:sp>
@@ -11263,82 +11255,100 @@
           <a:p>
             <a:r>
               <a:rPr dirty="0"/>
-              <a:t>Als erstes soll mit schwarz und weiß gearbeitet werden.</a:t>
-            </a:r>
-            <a:br>
+              <a:t>Das Grundprinzip ist, Informationen bestmöglich zu transportieren. Dazu muss vor allem die Schrift einheitlich und für alle im Raum lesbar sein. </a:t>
+            </a:r>
+          </a:p>
+          <a:p>
+            <a:endParaRPr dirty="0"/>
+          </a:p>
+          <a:p>
+            <a:r>
+              <a:rPr dirty="0" err="1"/>
+              <a:t>Schriftart</a:t>
+            </a:r>
+            <a:r>
               <a:rPr dirty="0"/>
-            </a:br>
+              <a:t>: Arial</a:t>
+            </a:r>
+          </a:p>
+          <a:p>
+            <a:endParaRPr dirty="0"/>
+          </a:p>
+          <a:p>
+            <a:r>
+              <a:rPr dirty="0" err="1"/>
+              <a:t>Schriftgr</a:t>
+            </a:r>
+            <a:r>
+              <a:rPr lang="de-DE" dirty="0" err="1"/>
+              <a:t>ößen</a:t>
+            </a:r>
             <a:r>
               <a:rPr dirty="0"/>
-              <a:t>Für Aufwändigere Darstellungen sind Farben mit Bedacht und in möglichst geringem Umfang einzusetzen.</a:t>
-            </a:r>
-            <a:br>
+              <a:t>:</a:t>
+            </a:r>
+            <a:r>
+              <a:rPr lang="de-DE" dirty="0"/>
+              <a:t>30 | 22 | 16 | 12</a:t>
+            </a:r>
+            <a:endParaRPr dirty="0"/>
+          </a:p>
+          <a:p>
+            <a:endParaRPr dirty="0"/>
+          </a:p>
+          <a:p>
+            <a:r>
+              <a:rPr dirty="0" err="1"/>
+              <a:t>Zeilenabstand</a:t>
+            </a:r>
+            <a:r>
               <a:rPr dirty="0"/>
-            </a:br>
+              <a:t>: 1,15mm</a:t>
+            </a:r>
+          </a:p>
+          <a:p>
             <a:endParaRPr dirty="0"/>
           </a:p>
           <a:p>
             <a:r>
               <a:rPr dirty="0"/>
-              <a:t>In diesem Folienmaster ist die Farbpalette festgelegt.</a:t>
-            </a:r>
-          </a:p>
-          <a:p>
+              <a:t>Die Einstellungen sind in den Textfeldern und Textfeldvorlagen dieses ppt-Masters als Standard eingestellt. Bei Diagrammen und Tabellen muss die Schriftgröße ggf. angepasst werden.</a:t>
+            </a:r>
+            <a:r>
+              <a:rPr lang="de-DE" dirty="0"/>
+              <a:t> Für Auszeichnungen im Fließtext kann auch </a:t>
+            </a:r>
+            <a:r>
+              <a:rPr lang="de-DE" b="1" dirty="0"/>
+              <a:t>fett </a:t>
+            </a:r>
+            <a:r>
+              <a:rPr lang="de-DE" dirty="0"/>
+              <a:t>markiert werden.</a:t>
+            </a:r>
             <a:endParaRPr dirty="0"/>
           </a:p>
           <a:p>
             <a:r>
               <a:rPr dirty="0"/>
-              <a:t>Zuerst mit </a:t>
-            </a:r>
-            <a:r>
-              <a:rPr lang="de-DE" dirty="0"/>
-              <a:t>den Primärfarben </a:t>
+              <a:t>Bei großer Distanz bzw. </a:t>
+            </a:r>
+            <a:r>
+              <a:rPr dirty="0" err="1"/>
+              <a:t>kleinem</a:t>
             </a:r>
             <a:r>
               <a:rPr dirty="0"/>
-              <a:t>arbeiten</a:t>
-            </a:r>
-            <a:r>
-              <a:rPr lang="de-DE" dirty="0"/>
-              <a:t>.</a:t>
-            </a:r>
-          </a:p>
-          <a:p>
-            <a:endParaRPr lang="de-DE" dirty="0"/>
-          </a:p>
-          <a:p>
-            <a:endParaRPr lang="de-DE" dirty="0"/>
-          </a:p>
-          <a:p>
+              <a:t> </a:t>
+            </a:r>
+            <a:r>
+              <a:rPr dirty="0" err="1"/>
+              <a:t>Präsentationsmedium</a:t>
+            </a:r>
             <a:r>
               <a:rPr dirty="0"/>
-              <a:t>Für z.B. komplexe Diagramme stehen noch</a:t>
-            </a:r>
-            <a:r>
-              <a:rPr lang="de-DE" dirty="0"/>
-              <a:t>Sekundärfarben </a:t>
-            </a:r>
-            <a:r>
-              <a:rPr dirty="0"/>
-              <a:t>zur Verfügung.</a:t>
-            </a:r>
-          </a:p>
-          <a:p>
-            <a:endParaRPr dirty="0"/>
-          </a:p>
-          <a:p>
-            <a:endParaRPr dirty="0"/>
-          </a:p>
-          <a:p>
-            <a:r>
-              <a:rPr lang="de-DE" dirty="0"/>
-              <a:t>Gering im Einsatz sind die Akzentfarben.</a:t>
-            </a:r>
-            <a:endParaRPr dirty="0"/>
-          </a:p>
-          <a:p>
-            <a:endParaRPr dirty="0"/>
+              <a:t> kann der Schriftgrad notfalls proportional erhöht werden.</a:t>
+            </a:r>
           </a:p>
         </p:txBody>
       </p:sp>
@@ -11365,6 +11375,205 @@
               <a:rPr lang="de-DE" smtClean="0"/>
               <a:pPr/>
               <a:t>16</a:t>
+            </a:fld>
+            <a:endParaRPr lang="de-DE" dirty="0"/>
+          </a:p>
+        </p:txBody>
+      </p:sp>
+      <p:sp>
+        <p:nvSpPr>
+          <p:cNvPr id="6" name="Fußzeilenplatzhalter 4"/>
+          <p:cNvSpPr>
+            <a:spLocks noGrp="1"/>
+          </p:cNvSpPr>
+          <p:nvPr>
+            <p:ph type="ftr" sz="quarter" idx="12"/>
+          </p:nvPr>
+        </p:nvSpPr>
+        <p:spPr/>
+        <p:txBody>
+          <a:bodyPr/>
+          <a:lstStyle/>
+          <a:p>
+            <a:r>
+              <a:rPr lang="de-DE"/>
+              <a:t>Dr. rer. nat. Erika Mustermann (TUM) | kann beliebig erweitert werden | Infos mit Strich trennen</a:t>
+            </a:r>
+            <a:endParaRPr lang="en-US" dirty="0"/>
+          </a:p>
+        </p:txBody>
+      </p:sp>
+      <p:sp>
+        <p:nvSpPr>
+          <p:cNvPr id="3" name="Titel 2"/>
+          <p:cNvSpPr>
+            <a:spLocks noGrp="1"/>
+          </p:cNvSpPr>
+          <p:nvPr>
+            <p:ph type="title"/>
+          </p:nvPr>
+        </p:nvSpPr>
+        <p:spPr>
+          <a:prstGeom prst="rect">
+            <a:avLst/>
+          </a:prstGeom>
+        </p:spPr>
+        <p:txBody>
+          <a:bodyPr/>
+          <a:lstStyle/>
+          <a:p>
+            <a:r>
+              <a:rPr sz="3000" dirty="0"/>
+              <a:t>Schrift</a:t>
+            </a:r>
+            <a:endParaRPr lang="de-DE" sz="3000" dirty="0"/>
+          </a:p>
+        </p:txBody>
+      </p:sp>
+    </p:spTree>
+  </p:cSld>
+  <p:clrMapOvr>
+    <a:masterClrMapping/>
+  </p:clrMapOvr>
+</p:sld>
+</file>
+
+<file path=ppt/slides/slide17.xml><?xml version="1.0" encoding="utf-8"?>
+<p:sld xmlns:a="http://schemas.openxmlformats.org/drawingml/2006/main" xmlns:r="http://schemas.openxmlformats.org/officeDocument/2006/relationships" xmlns:p="http://schemas.openxmlformats.org/presentationml/2006/main">
+  <p:cSld>
+    <p:spTree>
+      <p:nvGrpSpPr>
+        <p:cNvPr id="1" name=""/>
+        <p:cNvGrpSpPr/>
+        <p:nvPr/>
+      </p:nvGrpSpPr>
+      <p:grpSpPr>
+        <a:xfrm>
+          <a:off x="0" y="0"/>
+          <a:ext cx="0" cy="0"/>
+          <a:chOff x="0" y="0"/>
+          <a:chExt cx="0" cy="0"/>
+        </a:xfrm>
+      </p:grpSpPr>
+      <p:sp>
+        <p:nvSpPr>
+          <p:cNvPr id="2" name="Inhaltsplatzhalter 1"/>
+          <p:cNvSpPr>
+            <a:spLocks noGrp="1"/>
+          </p:cNvSpPr>
+          <p:nvPr>
+            <p:ph idx="1"/>
+          </p:nvPr>
+        </p:nvSpPr>
+        <p:spPr/>
+        <p:txBody>
+          <a:bodyPr/>
+          <a:lstStyle/>
+          <a:p>
+            <a:r>
+              <a:rPr dirty="0"/>
+              <a:t>Als erstes soll mit schwarz und weiß gearbeitet werden.</a:t>
+            </a:r>
+            <a:br>
+              <a:rPr dirty="0"/>
+            </a:br>
+            <a:r>
+              <a:rPr dirty="0"/>
+              <a:t>Für Aufwändigere Darstellungen sind Farben mit Bedacht und in möglichst geringem Umfang einzusetzen.</a:t>
+            </a:r>
+            <a:br>
+              <a:rPr dirty="0"/>
+            </a:br>
+            <a:endParaRPr dirty="0"/>
+          </a:p>
+          <a:p>
+            <a:r>
+              <a:rPr dirty="0"/>
+              <a:t>In diesem Folienmaster ist die Farbpalette festgelegt.</a:t>
+            </a:r>
+          </a:p>
+          <a:p>
+            <a:endParaRPr dirty="0"/>
+          </a:p>
+          <a:p>
+            <a:r>
+              <a:rPr dirty="0"/>
+              <a:t>Zuerst mit </a:t>
+            </a:r>
+            <a:r>
+              <a:rPr lang="de-DE" dirty="0"/>
+              <a:t>den Primärfarben </a:t>
+            </a:r>
+            <a:r>
+              <a:rPr dirty="0"/>
+              <a:t>arbeiten</a:t>
+            </a:r>
+            <a:r>
+              <a:rPr lang="de-DE" dirty="0"/>
+              <a:t>.</a:t>
+            </a:r>
+          </a:p>
+          <a:p>
+            <a:endParaRPr lang="de-DE" dirty="0"/>
+          </a:p>
+          <a:p>
+            <a:endParaRPr lang="de-DE" dirty="0"/>
+          </a:p>
+          <a:p>
+            <a:r>
+              <a:rPr dirty="0"/>
+              <a:t>Für z.B. komplexe Diagramme stehen noch</a:t>
+            </a:r>
+            <a:r>
+              <a:rPr lang="de-DE" dirty="0"/>
+              <a:t>Sekundärfarben </a:t>
+            </a:r>
+            <a:r>
+              <a:rPr dirty="0"/>
+              <a:t>zur Verfügung.</a:t>
+            </a:r>
+          </a:p>
+          <a:p>
+            <a:endParaRPr dirty="0"/>
+          </a:p>
+          <a:p>
+            <a:endParaRPr dirty="0"/>
+          </a:p>
+          <a:p>
+            <a:r>
+              <a:rPr lang="de-DE" dirty="0"/>
+              <a:t>Gering im Einsatz sind die Akzentfarben.</a:t>
+            </a:r>
+            <a:endParaRPr dirty="0"/>
+          </a:p>
+          <a:p>
+            <a:endParaRPr dirty="0"/>
+          </a:p>
+        </p:txBody>
+      </p:sp>
+      <p:sp>
+        <p:nvSpPr>
+          <p:cNvPr id="4" name="Foliennummernplatzhalter 3"/>
+          <p:cNvSpPr>
+            <a:spLocks noGrp="1"/>
+          </p:cNvSpPr>
+          <p:nvPr>
+            <p:ph type="sldNum" sz="quarter" idx="11"/>
+          </p:nvPr>
+        </p:nvSpPr>
+        <p:spPr>
+          <a:prstGeom prst="rect">
+            <a:avLst/>
+          </a:prstGeom>
+        </p:spPr>
+        <p:txBody>
+          <a:bodyPr/>
+          <a:lstStyle/>
+          <a:p>
+            <a:fld id="{CE58CB1E-F828-4F11-99E0-327109AF9DA4}" type="slidenum">
+              <a:rPr lang="de-DE" smtClean="0"/>
+              <a:pPr/>
+              <a:t>17</a:t>
             </a:fld>
             <a:endParaRPr lang="de-DE" dirty="0"/>
           </a:p>
@@ -11992,139 +12201,6 @@
 </p:sld>
 </file>
 
-<file path=ppt/slides/slide17.xml><?xml version="1.0" encoding="utf-8"?>
-<p:sld xmlns:a="http://schemas.openxmlformats.org/drawingml/2006/main" xmlns:r="http://schemas.openxmlformats.org/officeDocument/2006/relationships" xmlns:p="http://schemas.openxmlformats.org/presentationml/2006/main">
-  <p:cSld>
-    <p:spTree>
-      <p:nvGrpSpPr>
-        <p:cNvPr id="1" name=""/>
-        <p:cNvGrpSpPr/>
-        <p:nvPr/>
-      </p:nvGrpSpPr>
-      <p:grpSpPr>
-        <a:xfrm>
-          <a:off x="0" y="0"/>
-          <a:ext cx="0" cy="0"/>
-          <a:chOff x="0" y="0"/>
-          <a:chExt cx="0" cy="0"/>
-        </a:xfrm>
-      </p:grpSpPr>
-      <p:sp>
-        <p:nvSpPr>
-          <p:cNvPr id="2" name="Inhaltsplatzhalter 1"/>
-          <p:cNvSpPr>
-            <a:spLocks noGrp="1"/>
-          </p:cNvSpPr>
-          <p:nvPr>
-            <p:ph idx="1"/>
-          </p:nvPr>
-        </p:nvSpPr>
-        <p:spPr/>
-        <p:txBody>
-          <a:bodyPr/>
-          <a:lstStyle/>
-          <a:p>
-            <a:r>
-              <a:t>Kurze und knappe Texte, Fließtexte linksbündig, kein Blocksatz</a:t>
-            </a:r>
-          </a:p>
-          <a:p>
-            <a:endParaRPr/>
-          </a:p>
-          <a:p>
-            <a:r>
-              <a:t>Beispiel:</a:t>
-            </a:r>
-          </a:p>
-          <a:p>
-            <a:r>
-              <a:t>Tem soluptam, nisi as verum ereprehendam at acculpa quidisq uissit volupta tusdant utem as etur, odi odis es doluptiae dem nimaion con nossinctenis pora quam voloria consenimus blabore everfer epeliquo maio etur.</a:t>
-            </a:r>
-          </a:p>
-        </p:txBody>
-      </p:sp>
-      <p:sp>
-        <p:nvSpPr>
-          <p:cNvPr id="4" name="Foliennummernplatzhalter 3"/>
-          <p:cNvSpPr>
-            <a:spLocks noGrp="1"/>
-          </p:cNvSpPr>
-          <p:nvPr>
-            <p:ph type="sldNum" sz="quarter" idx="11"/>
-          </p:nvPr>
-        </p:nvSpPr>
-        <p:spPr/>
-        <p:txBody>
-          <a:bodyPr/>
-          <a:lstStyle/>
-          <a:p>
-            <a:fld id="{CE58CB1E-F828-4F11-99E0-327109AF9DA4}" type="slidenum">
-              <a:rPr lang="de-DE" smtClean="0"/>
-              <a:pPr/>
-              <a:t>17</a:t>
-            </a:fld>
-            <a:endParaRPr lang="de-DE" dirty="0"/>
-          </a:p>
-        </p:txBody>
-      </p:sp>
-      <p:sp>
-        <p:nvSpPr>
-          <p:cNvPr id="6" name="Fußzeilenplatzhalter 4"/>
-          <p:cNvSpPr>
-            <a:spLocks noGrp="1"/>
-          </p:cNvSpPr>
-          <p:nvPr>
-            <p:ph type="ftr" sz="quarter" idx="12"/>
-          </p:nvPr>
-        </p:nvSpPr>
-        <p:spPr/>
-        <p:txBody>
-          <a:bodyPr/>
-          <a:lstStyle/>
-          <a:p>
-            <a:r>
-              <a:rPr lang="de-DE"/>
-              <a:t>Dr. rer. nat. Erika Mustermann (TUM) | kann beliebig erweitert werden | Infos mit Strich trennen</a:t>
-            </a:r>
-            <a:endParaRPr lang="en-US" dirty="0"/>
-          </a:p>
-        </p:txBody>
-      </p:sp>
-      <p:sp>
-        <p:nvSpPr>
-          <p:cNvPr id="3" name="Titel 2"/>
-          <p:cNvSpPr>
-            <a:spLocks noGrp="1"/>
-          </p:cNvSpPr>
-          <p:nvPr>
-            <p:ph type="title"/>
-          </p:nvPr>
-        </p:nvSpPr>
-        <p:spPr>
-          <a:prstGeom prst="rect">
-            <a:avLst/>
-          </a:prstGeom>
-        </p:spPr>
-        <p:txBody>
-          <a:bodyPr/>
-          <a:lstStyle/>
-          <a:p>
-            <a:r>
-              <a:rPr dirty="0"/>
-              <a:t>Texte</a:t>
-            </a:r>
-            <a:endParaRPr lang="de-DE" dirty="0"/>
-          </a:p>
-        </p:txBody>
-      </p:sp>
-    </p:spTree>
-  </p:cSld>
-  <p:clrMapOvr>
-    <a:masterClrMapping/>
-  </p:clrMapOvr>
-</p:sld>
-</file>
-
 <file path=ppt/slides/slide18.xml><?xml version="1.0" encoding="utf-8"?>
 <p:sld xmlns:a="http://schemas.openxmlformats.org/drawingml/2006/main" xmlns:r="http://schemas.openxmlformats.org/officeDocument/2006/relationships" xmlns:p="http://schemas.openxmlformats.org/presentationml/2006/main">
   <p:cSld>
@@ -12158,94 +12234,21 @@
           <a:lstStyle/>
           <a:p>
             <a:r>
-              <a:rPr lang="de-DE"/>
-              <a:t>Bei kleinen Aufzählungen auf Aufzählungszeichen verzichten und ggf. zusätzliche Leerzeile</a:t>
-            </a:r>
-          </a:p>
-          <a:p>
-            <a:r>
-              <a:rPr lang="de-DE"/>
-              <a:t>Nur die wesentlichen Punkte nennen und Themen auf verschiedene Seiten splitten.</a:t>
-            </a:r>
-          </a:p>
-          <a:p>
-            <a:endParaRPr lang="de-DE"/>
-          </a:p>
-          <a:p>
-            <a:r>
-              <a:rPr lang="de-DE"/>
-              <a:t>Punkt 1</a:t>
-            </a:r>
-          </a:p>
-          <a:p>
-            <a:endParaRPr lang="de-DE"/>
-          </a:p>
-          <a:p>
-            <a:r>
-              <a:rPr lang="de-DE"/>
-              <a:t>Punkt 2</a:t>
-            </a:r>
-          </a:p>
-          <a:p>
-            <a:endParaRPr lang="de-DE"/>
-          </a:p>
-          <a:p>
-            <a:r>
-              <a:rPr lang="de-DE"/>
-              <a:t>Wenn Unterpunkte in einer Aufzählung nötig sind ist ein Einrücken mit – möglich</a:t>
-            </a:r>
-          </a:p>
-          <a:p>
-            <a:pPr lvl="1"/>
-            <a:r>
-              <a:rPr lang="de-DE"/>
-              <a:t>Unterpunkt 1</a:t>
-            </a:r>
-          </a:p>
-          <a:p>
-            <a:pPr lvl="2"/>
-            <a:r>
-              <a:rPr lang="de-DE"/>
-              <a:t>Unterpunkt 1</a:t>
-            </a:r>
-          </a:p>
-          <a:p>
-            <a:pPr lvl="2"/>
-            <a:r>
-              <a:rPr lang="de-DE"/>
-              <a:t>Unterpunkt 2</a:t>
-            </a:r>
-          </a:p>
-          <a:p>
-            <a:endParaRPr lang="de-DE"/>
-          </a:p>
-          <a:p>
-            <a:r>
-              <a:rPr lang="de-DE"/>
-              <a:t>Bei größeren Listen die Standardeinstellung • verwenden</a:t>
-            </a:r>
-          </a:p>
-          <a:p>
-            <a:pPr lvl="1"/>
-            <a:r>
-              <a:rPr lang="de-DE"/>
-              <a:t>Unterpunkt 1</a:t>
-            </a:r>
-          </a:p>
-          <a:p>
-            <a:pPr lvl="1"/>
-            <a:r>
-              <a:rPr lang="de-DE"/>
-              <a:t>Unterpunkt 2</a:t>
-            </a:r>
-          </a:p>
-          <a:p>
-            <a:pPr lvl="1"/>
-            <a:r>
-              <a:rPr lang="de-DE"/>
-              <a:t>Unterpunkt 3</a:t>
-            </a:r>
-            <a:endParaRPr lang="de-DE" dirty="0"/>
+              <a:t>Kurze und knappe Texte, Fließtexte linksbündig, kein Blocksatz</a:t>
+            </a:r>
+          </a:p>
+          <a:p>
+            <a:endParaRPr/>
+          </a:p>
+          <a:p>
+            <a:r>
+              <a:t>Beispiel:</a:t>
+            </a:r>
+          </a:p>
+          <a:p>
+            <a:r>
+              <a:t>Tem soluptam, nisi as verum ereprehendam at acculpa quidisq uissit volupta tusdant utem as etur, odi odis es doluptiae dem nimaion con nossinctenis pora quam voloria consenimus blabore everfer epeliquo maio etur.</a:t>
+            </a:r>
           </a:p>
         </p:txBody>
       </p:sp>
@@ -12275,7 +12278,7 @@
       </p:sp>
       <p:sp>
         <p:nvSpPr>
-          <p:cNvPr id="5" name="Fußzeilenplatzhalter 4"/>
+          <p:cNvPr id="6" name="Fußzeilenplatzhalter 4"/>
           <p:cNvSpPr>
             <a:spLocks noGrp="1"/>
           </p:cNvSpPr>
@@ -12306,14 +12309,18 @@
             <p:ph type="title"/>
           </p:nvPr>
         </p:nvSpPr>
-        <p:spPr/>
+        <p:spPr>
+          <a:prstGeom prst="rect">
+            <a:avLst/>
+          </a:prstGeom>
+        </p:spPr>
         <p:txBody>
           <a:bodyPr/>
           <a:lstStyle/>
           <a:p>
             <a:r>
-              <a:rPr lang="de-DE"/>
-              <a:t>Aufzählung</a:t>
+              <a:rPr dirty="0"/>
+              <a:t>Texte</a:t>
             </a:r>
             <a:endParaRPr lang="de-DE" dirty="0"/>
           </a:p>
@@ -12360,27 +12367,94 @@
           <a:lstStyle/>
           <a:p>
             <a:r>
-              <a:t>schlichte Darstellung von Informationen</a:t>
-            </a:r>
-          </a:p>
-          <a:p>
-            <a:endParaRPr/>
-          </a:p>
-          <a:p>
-            <a:r>
-              <a:t>reduzierte Farben</a:t>
-            </a:r>
-          </a:p>
-          <a:p>
-            <a:endParaRPr/>
-          </a:p>
-          <a:p>
-            <a:r>
-              <a:t>Rahmen und Überlagerungen nach Möglichkeit vermeiden</a:t>
-            </a:r>
-          </a:p>
-          <a:p>
-            <a:endParaRPr dirty="0"/>
+              <a:rPr lang="de-DE"/>
+              <a:t>Bei kleinen Aufzählungen auf Aufzählungszeichen verzichten und ggf. zusätzliche Leerzeile</a:t>
+            </a:r>
+          </a:p>
+          <a:p>
+            <a:r>
+              <a:rPr lang="de-DE"/>
+              <a:t>Nur die wesentlichen Punkte nennen und Themen auf verschiedene Seiten splitten.</a:t>
+            </a:r>
+          </a:p>
+          <a:p>
+            <a:endParaRPr lang="de-DE"/>
+          </a:p>
+          <a:p>
+            <a:r>
+              <a:rPr lang="de-DE"/>
+              <a:t>Punkt 1</a:t>
+            </a:r>
+          </a:p>
+          <a:p>
+            <a:endParaRPr lang="de-DE"/>
+          </a:p>
+          <a:p>
+            <a:r>
+              <a:rPr lang="de-DE"/>
+              <a:t>Punkt 2</a:t>
+            </a:r>
+          </a:p>
+          <a:p>
+            <a:endParaRPr lang="de-DE"/>
+          </a:p>
+          <a:p>
+            <a:r>
+              <a:rPr lang="de-DE"/>
+              <a:t>Wenn Unterpunkte in einer Aufzählung nötig sind ist ein Einrücken mit – möglich</a:t>
+            </a:r>
+          </a:p>
+          <a:p>
+            <a:pPr lvl="1"/>
+            <a:r>
+              <a:rPr lang="de-DE"/>
+              <a:t>Unterpunkt 1</a:t>
+            </a:r>
+          </a:p>
+          <a:p>
+            <a:pPr lvl="2"/>
+            <a:r>
+              <a:rPr lang="de-DE"/>
+              <a:t>Unterpunkt 1</a:t>
+            </a:r>
+          </a:p>
+          <a:p>
+            <a:pPr lvl="2"/>
+            <a:r>
+              <a:rPr lang="de-DE"/>
+              <a:t>Unterpunkt 2</a:t>
+            </a:r>
+          </a:p>
+          <a:p>
+            <a:endParaRPr lang="de-DE"/>
+          </a:p>
+          <a:p>
+            <a:r>
+              <a:rPr lang="de-DE"/>
+              <a:t>Bei größeren Listen die Standardeinstellung • verwenden</a:t>
+            </a:r>
+          </a:p>
+          <a:p>
+            <a:pPr lvl="1"/>
+            <a:r>
+              <a:rPr lang="de-DE"/>
+              <a:t>Unterpunkt 1</a:t>
+            </a:r>
+          </a:p>
+          <a:p>
+            <a:pPr lvl="1"/>
+            <a:r>
+              <a:rPr lang="de-DE"/>
+              <a:t>Unterpunkt 2</a:t>
+            </a:r>
+          </a:p>
+          <a:p>
+            <a:pPr lvl="1"/>
+            <a:r>
+              <a:rPr lang="de-DE"/>
+              <a:t>Unterpunkt 3</a:t>
+            </a:r>
+            <a:endParaRPr lang="de-DE" dirty="0"/>
           </a:p>
         </p:txBody>
       </p:sp>
@@ -12410,7 +12484,7 @@
       </p:sp>
       <p:sp>
         <p:nvSpPr>
-          <p:cNvPr id="6" name="Fußzeilenplatzhalter 4"/>
+          <p:cNvPr id="5" name="Fußzeilenplatzhalter 4"/>
           <p:cNvSpPr>
             <a:spLocks noGrp="1"/>
           </p:cNvSpPr>
@@ -12441,20 +12515,16 @@
             <p:ph type="title"/>
           </p:nvPr>
         </p:nvSpPr>
-        <p:spPr>
-          <a:prstGeom prst="rect">
-            <a:avLst/>
-          </a:prstGeom>
-        </p:spPr>
+        <p:spPr/>
         <p:txBody>
           <a:bodyPr/>
           <a:lstStyle/>
           <a:p>
             <a:r>
-              <a:rPr sz="3000"/>
-              <a:t>Bilder - Allgemein</a:t>
-            </a:r>
-            <a:endParaRPr lang="de-DE" sz="3000" dirty="0"/>
+              <a:rPr lang="de-DE"/>
+              <a:t>Aufzählung</a:t>
+            </a:r>
+            <a:endParaRPr lang="de-DE" dirty="0"/>
           </a:p>
         </p:txBody>
       </p:sp>
@@ -12557,12 +12627,12 @@
       </p:grpSpPr>
       <p:sp>
         <p:nvSpPr>
-          <p:cNvPr id="3" name="Textplatzhalter 2"/>
-          <p:cNvSpPr>
-            <a:spLocks noGrp="1"/>
-          </p:cNvSpPr>
-          <p:nvPr>
-            <p:ph type="body" sz="quarter" idx="13"/>
+          <p:cNvPr id="2" name="Inhaltsplatzhalter 1"/>
+          <p:cNvSpPr>
+            <a:spLocks noGrp="1"/>
+          </p:cNvSpPr>
+          <p:nvPr>
+            <p:ph idx="1"/>
           </p:nvPr>
         </p:nvSpPr>
         <p:spPr/>
@@ -12571,27 +12641,38 @@
           <a:lstStyle/>
           <a:p>
             <a:r>
-              <a:rPr lang="de-DE"/>
-              <a:t>Bildbeschreibung</a:t>
-            </a:r>
-            <a:br>
-              <a:rPr lang="de-DE"/>
-            </a:br>
-            <a:r>
-              <a:rPr lang="de-DE"/>
-              <a:t>oberer Bildrand: Begrenzung durch Text</a:t>
-            </a:r>
-          </a:p>
-        </p:txBody>
-      </p:sp>
-      <p:sp>
-        <p:nvSpPr>
-          <p:cNvPr id="5" name="Foliennummernplatzhalter 4"/>
-          <p:cNvSpPr>
-            <a:spLocks noGrp="1"/>
-          </p:cNvSpPr>
-          <p:nvPr>
-            <p:ph type="sldNum" sz="quarter" idx="15"/>
+              <a:t>schlichte Darstellung von Informationen</a:t>
+            </a:r>
+          </a:p>
+          <a:p>
+            <a:endParaRPr/>
+          </a:p>
+          <a:p>
+            <a:r>
+              <a:t>reduzierte Farben</a:t>
+            </a:r>
+          </a:p>
+          <a:p>
+            <a:endParaRPr/>
+          </a:p>
+          <a:p>
+            <a:r>
+              <a:t>Rahmen und Überlagerungen nach Möglichkeit vermeiden</a:t>
+            </a:r>
+          </a:p>
+          <a:p>
+            <a:endParaRPr dirty="0"/>
+          </a:p>
+        </p:txBody>
+      </p:sp>
+      <p:sp>
+        <p:nvSpPr>
+          <p:cNvPr id="4" name="Foliennummernplatzhalter 3"/>
+          <p:cNvSpPr>
+            <a:spLocks noGrp="1"/>
+          </p:cNvSpPr>
+          <p:nvPr>
+            <p:ph type="sldNum" sz="quarter" idx="11"/>
           </p:nvPr>
         </p:nvSpPr>
         <p:spPr/>
@@ -12610,12 +12691,12 @@
       </p:sp>
       <p:sp>
         <p:nvSpPr>
-          <p:cNvPr id="10" name="Fußzeilenplatzhalter 4"/>
-          <p:cNvSpPr>
-            <a:spLocks noGrp="1"/>
-          </p:cNvSpPr>
-          <p:nvPr>
-            <p:ph type="ftr" sz="quarter" idx="16"/>
+          <p:cNvPr id="6" name="Fußzeilenplatzhalter 4"/>
+          <p:cNvSpPr>
+            <a:spLocks noGrp="1"/>
+          </p:cNvSpPr>
+          <p:nvPr>
+            <p:ph type="ftr" sz="quarter" idx="12"/>
           </p:nvPr>
         </p:nvSpPr>
         <p:spPr/>
@@ -12633,55 +12714,28 @@
       </p:sp>
       <p:sp>
         <p:nvSpPr>
-          <p:cNvPr id="22" name="Inhaltsplatzhalter 21"/>
-          <p:cNvSpPr>
-            <a:spLocks noGrp="1"/>
-          </p:cNvSpPr>
-          <p:nvPr>
-            <p:ph sz="quarter" idx="18"/>
-          </p:nvPr>
-        </p:nvSpPr>
-        <p:spPr/>
+          <p:cNvPr id="3" name="Titel 2"/>
+          <p:cNvSpPr>
+            <a:spLocks noGrp="1"/>
+          </p:cNvSpPr>
+          <p:nvPr>
+            <p:ph type="title"/>
+          </p:nvPr>
+        </p:nvSpPr>
+        <p:spPr>
+          <a:prstGeom prst="rect">
+            <a:avLst/>
+          </a:prstGeom>
+        </p:spPr>
         <p:txBody>
           <a:bodyPr/>
           <a:lstStyle/>
           <a:p>
-            <a:endParaRPr lang="de-DE"/>
-          </a:p>
-        </p:txBody>
-      </p:sp>
-      <p:sp>
-        <p:nvSpPr>
-          <p:cNvPr id="21" name="Bildplatzhalter 20"/>
-          <p:cNvSpPr>
-            <a:spLocks noGrp="1"/>
-          </p:cNvSpPr>
-          <p:nvPr>
-            <p:ph type="pic" sz="quarter" idx="14"/>
-          </p:nvPr>
-        </p:nvSpPr>
-        <p:spPr/>
-      </p:sp>
-      <p:sp>
-        <p:nvSpPr>
-          <p:cNvPr id="4" name="Titel 3"/>
-          <p:cNvSpPr>
-            <a:spLocks noGrp="1"/>
-          </p:cNvSpPr>
-          <p:nvPr>
-            <p:ph type="title"/>
-          </p:nvPr>
-        </p:nvSpPr>
-        <p:spPr/>
-        <p:txBody>
-          <a:bodyPr/>
-          <a:lstStyle/>
-          <a:p>
-            <a:r>
-              <a:rPr lang="de-DE"/>
-              <a:t>Bilder</a:t>
-            </a:r>
-            <a:endParaRPr lang="de-DE" dirty="0"/>
+            <a:r>
+              <a:rPr sz="3000"/>
+              <a:t>Bilder - Allgemein</a:t>
+            </a:r>
+            <a:endParaRPr lang="de-DE" sz="3000" dirty="0"/>
           </a:p>
         </p:txBody>
       </p:sp>
@@ -12717,7 +12771,7 @@
             <a:spLocks noGrp="1"/>
           </p:cNvSpPr>
           <p:nvPr>
-            <p:ph idx="14"/>
+            <p:ph type="body" sz="quarter" idx="13"/>
           </p:nvPr>
         </p:nvSpPr>
         <p:spPr/>
@@ -12726,76 +12780,16 @@
           <a:lstStyle/>
           <a:p>
             <a:r>
-              <a:rPr lang="de-DE" dirty="0"/>
-              <a:t>Überschrift 2</a:t>
-            </a:r>
-          </a:p>
-          <a:p>
-            <a:r>
-              <a:rPr lang="de-DE" dirty="0"/>
-              <a:t>Hier steht ein einleitender oder beschreibender Fließtext und nach Wunsch eine Aufzählung</a:t>
-            </a:r>
-          </a:p>
-          <a:p>
-            <a:endParaRPr lang="de-DE" dirty="0"/>
-          </a:p>
-          <a:p>
-            <a:r>
-              <a:rPr lang="de-DE" dirty="0"/>
-              <a:t>Punkt 1</a:t>
-            </a:r>
-          </a:p>
-          <a:p>
-            <a:endParaRPr lang="de-DE" dirty="0"/>
-          </a:p>
-          <a:p>
-            <a:r>
-              <a:rPr lang="de-DE" dirty="0"/>
-              <a:t>Punkt 2</a:t>
-            </a:r>
-          </a:p>
-          <a:p>
-            <a:endParaRPr lang="de-DE" dirty="0"/>
-          </a:p>
-          <a:p>
-            <a:r>
-              <a:rPr lang="de-DE" dirty="0"/>
-              <a:t>Punkt 3</a:t>
-            </a:r>
-          </a:p>
-          <a:p>
-            <a:endParaRPr lang="de-DE" dirty="0"/>
-          </a:p>
-          <a:p>
-            <a:r>
-              <a:rPr lang="de-DE" dirty="0"/>
-              <a:t>Punkt 4</a:t>
-            </a:r>
-          </a:p>
-          <a:p>
-            <a:endParaRPr lang="de-DE" dirty="0"/>
-          </a:p>
-          <a:p>
-            <a:endParaRPr lang="de-DE" dirty="0"/>
-          </a:p>
-        </p:txBody>
-      </p:sp>
-      <p:sp>
-        <p:nvSpPr>
-          <p:cNvPr id="18" name="Inhaltsplatzhalter 17"/>
-          <p:cNvSpPr>
-            <a:spLocks noGrp="1"/>
-          </p:cNvSpPr>
-          <p:nvPr>
-            <p:ph idx="15"/>
-          </p:nvPr>
-        </p:nvSpPr>
-        <p:spPr/>
-        <p:txBody>
-          <a:bodyPr/>
-          <a:lstStyle/>
-          <a:p>
-            <a:endParaRPr lang="de-DE"/>
+              <a:rPr lang="de-DE"/>
+              <a:t>Bildbeschreibung</a:t>
+            </a:r>
+            <a:br>
+              <a:rPr lang="de-DE"/>
+            </a:br>
+            <a:r>
+              <a:rPr lang="de-DE"/>
+              <a:t>oberer Bildrand: Begrenzung durch Text</a:t>
+            </a:r>
           </a:p>
         </p:txBody>
       </p:sp>
@@ -12806,7 +12800,7 @@
             <a:spLocks noGrp="1"/>
           </p:cNvSpPr>
           <p:nvPr>
-            <p:ph type="sldNum" sz="quarter" idx="16"/>
+            <p:ph type="sldNum" sz="quarter" idx="15"/>
           </p:nvPr>
         </p:nvSpPr>
         <p:spPr/>
@@ -12825,12 +12819,12 @@
       </p:sp>
       <p:sp>
         <p:nvSpPr>
-          <p:cNvPr id="7" name="Fußzeilenplatzhalter 4"/>
-          <p:cNvSpPr>
-            <a:spLocks noGrp="1"/>
-          </p:cNvSpPr>
-          <p:nvPr>
-            <p:ph type="ftr" sz="quarter" idx="17"/>
+          <p:cNvPr id="10" name="Fußzeilenplatzhalter 4"/>
+          <p:cNvSpPr>
+            <a:spLocks noGrp="1"/>
+          </p:cNvSpPr>
+          <p:nvPr>
+            <p:ph type="ftr" sz="quarter" idx="16"/>
           </p:nvPr>
         </p:nvSpPr>
         <p:spPr/>
@@ -12845,6 +12839,37 @@
             <a:endParaRPr lang="en-US" dirty="0"/>
           </a:p>
         </p:txBody>
+      </p:sp>
+      <p:sp>
+        <p:nvSpPr>
+          <p:cNvPr id="22" name="Inhaltsplatzhalter 21"/>
+          <p:cNvSpPr>
+            <a:spLocks noGrp="1"/>
+          </p:cNvSpPr>
+          <p:nvPr>
+            <p:ph sz="quarter" idx="18"/>
+          </p:nvPr>
+        </p:nvSpPr>
+        <p:spPr/>
+        <p:txBody>
+          <a:bodyPr/>
+          <a:lstStyle/>
+          <a:p>
+            <a:endParaRPr lang="de-DE"/>
+          </a:p>
+        </p:txBody>
+      </p:sp>
+      <p:sp>
+        <p:nvSpPr>
+          <p:cNvPr id="21" name="Bildplatzhalter 20"/>
+          <p:cNvSpPr>
+            <a:spLocks noGrp="1"/>
+          </p:cNvSpPr>
+          <p:nvPr>
+            <p:ph type="pic" sz="quarter" idx="14"/>
+          </p:nvPr>
+        </p:nvSpPr>
+        <p:spPr/>
       </p:sp>
       <p:sp>
         <p:nvSpPr>
@@ -12896,12 +12921,12 @@
       </p:grpSpPr>
       <p:sp>
         <p:nvSpPr>
-          <p:cNvPr id="18" name="Inhaltsplatzhalter 17"/>
-          <p:cNvSpPr>
-            <a:spLocks noGrp="1"/>
-          </p:cNvSpPr>
-          <p:nvPr>
-            <p:ph idx="1"/>
+          <p:cNvPr id="3" name="Textplatzhalter 2"/>
+          <p:cNvSpPr>
+            <a:spLocks noGrp="1"/>
+          </p:cNvSpPr>
+          <p:nvPr>
+            <p:ph idx="14"/>
           </p:nvPr>
         </p:nvSpPr>
         <p:spPr/>
@@ -12909,6 +12934,76 @@
           <a:bodyPr/>
           <a:lstStyle/>
           <a:p>
+            <a:r>
+              <a:rPr lang="de-DE" dirty="0"/>
+              <a:t>Überschrift 2</a:t>
+            </a:r>
+          </a:p>
+          <a:p>
+            <a:r>
+              <a:rPr lang="de-DE" dirty="0"/>
+              <a:t>Hier steht ein einleitender oder beschreibender Fließtext und nach Wunsch eine Aufzählung</a:t>
+            </a:r>
+          </a:p>
+          <a:p>
+            <a:endParaRPr lang="de-DE" dirty="0"/>
+          </a:p>
+          <a:p>
+            <a:r>
+              <a:rPr lang="de-DE" dirty="0"/>
+              <a:t>Punkt 1</a:t>
+            </a:r>
+          </a:p>
+          <a:p>
+            <a:endParaRPr lang="de-DE" dirty="0"/>
+          </a:p>
+          <a:p>
+            <a:r>
+              <a:rPr lang="de-DE" dirty="0"/>
+              <a:t>Punkt 2</a:t>
+            </a:r>
+          </a:p>
+          <a:p>
+            <a:endParaRPr lang="de-DE" dirty="0"/>
+          </a:p>
+          <a:p>
+            <a:r>
+              <a:rPr lang="de-DE" dirty="0"/>
+              <a:t>Punkt 3</a:t>
+            </a:r>
+          </a:p>
+          <a:p>
+            <a:endParaRPr lang="de-DE" dirty="0"/>
+          </a:p>
+          <a:p>
+            <a:r>
+              <a:rPr lang="de-DE" dirty="0"/>
+              <a:t>Punkt 4</a:t>
+            </a:r>
+          </a:p>
+          <a:p>
+            <a:endParaRPr lang="de-DE" dirty="0"/>
+          </a:p>
+          <a:p>
+            <a:endParaRPr lang="de-DE" dirty="0"/>
+          </a:p>
+        </p:txBody>
+      </p:sp>
+      <p:sp>
+        <p:nvSpPr>
+          <p:cNvPr id="18" name="Inhaltsplatzhalter 17"/>
+          <p:cNvSpPr>
+            <a:spLocks noGrp="1"/>
+          </p:cNvSpPr>
+          <p:nvPr>
+            <p:ph idx="15"/>
+          </p:nvPr>
+        </p:nvSpPr>
+        <p:spPr/>
+        <p:txBody>
+          <a:bodyPr/>
+          <a:lstStyle/>
+          <a:p>
             <a:endParaRPr lang="de-DE"/>
           </a:p>
         </p:txBody>
@@ -12920,7 +13015,7 @@
             <a:spLocks noGrp="1"/>
           </p:cNvSpPr>
           <p:nvPr>
-            <p:ph type="sldNum" sz="quarter" idx="11"/>
+            <p:ph type="sldNum" sz="quarter" idx="16"/>
           </p:nvPr>
         </p:nvSpPr>
         <p:spPr/>
@@ -12939,12 +13034,12 @@
       </p:sp>
       <p:sp>
         <p:nvSpPr>
-          <p:cNvPr id="8" name="Fußzeilenplatzhalter 4"/>
-          <p:cNvSpPr>
-            <a:spLocks noGrp="1"/>
-          </p:cNvSpPr>
-          <p:nvPr>
-            <p:ph type="ftr" sz="quarter" idx="12"/>
+          <p:cNvPr id="7" name="Fußzeilenplatzhalter 4"/>
+          <p:cNvSpPr>
+            <a:spLocks noGrp="1"/>
+          </p:cNvSpPr>
+          <p:nvPr>
+            <p:ph type="ftr" sz="quarter" idx="17"/>
           </p:nvPr>
         </p:nvSpPr>
         <p:spPr/>
@@ -12957,35 +13052,6 @@
               <a:t>Dr. rer. nat. Erika Mustermann (TUM) | kann beliebig erweitert werden | Infos mit Strich trennen</a:t>
             </a:r>
             <a:endParaRPr lang="en-US" dirty="0"/>
-          </a:p>
-        </p:txBody>
-      </p:sp>
-      <p:sp>
-        <p:nvSpPr>
-          <p:cNvPr id="3" name="Textplatzhalter 2"/>
-          <p:cNvSpPr>
-            <a:spLocks noGrp="1"/>
-          </p:cNvSpPr>
-          <p:nvPr>
-            <p:ph type="body" sz="quarter" idx="13"/>
-          </p:nvPr>
-        </p:nvSpPr>
-        <p:spPr/>
-        <p:txBody>
-          <a:bodyPr/>
-          <a:lstStyle/>
-          <a:p>
-            <a:r>
-              <a:rPr lang="de-DE"/>
-              <a:t>Bildbeschreibung</a:t>
-            </a:r>
-            <a:br>
-              <a:rPr lang="de-DE"/>
-            </a:br>
-            <a:r>
-              <a:rPr lang="de-DE"/>
-              <a:t>oberer Bildrand: Begrenzung durch Text</a:t>
-            </a:r>
           </a:p>
         </p:txBody>
       </p:sp>
@@ -13039,12 +13105,12 @@
       </p:grpSpPr>
       <p:sp>
         <p:nvSpPr>
-          <p:cNvPr id="3" name="Textplatzhalter 2"/>
-          <p:cNvSpPr>
-            <a:spLocks noGrp="1"/>
-          </p:cNvSpPr>
-          <p:nvPr>
-            <p:ph type="body" sz="quarter" idx="13"/>
+          <p:cNvPr id="18" name="Inhaltsplatzhalter 17"/>
+          <p:cNvSpPr>
+            <a:spLocks noGrp="1"/>
+          </p:cNvSpPr>
+          <p:nvPr>
+            <p:ph idx="1"/>
           </p:nvPr>
         </p:nvSpPr>
         <p:spPr/>
@@ -13052,17 +13118,7 @@
           <a:bodyPr/>
           <a:lstStyle/>
           <a:p>
-            <a:r>
-              <a:rPr lang="de-DE"/>
-              <a:t>Bildbeschreibung</a:t>
-            </a:r>
-            <a:br>
-              <a:rPr lang="de-DE"/>
-            </a:br>
-            <a:r>
-              <a:rPr lang="de-DE"/>
-              <a:t>oberer Bildrand: Begrenzung durch Text</a:t>
-            </a:r>
+            <a:endParaRPr lang="de-DE"/>
           </a:p>
         </p:txBody>
       </p:sp>
@@ -13073,7 +13129,7 @@
             <a:spLocks noGrp="1"/>
           </p:cNvSpPr>
           <p:nvPr>
-            <p:ph type="sldNum" sz="quarter" idx="15"/>
+            <p:ph type="sldNum" sz="quarter" idx="11"/>
           </p:nvPr>
         </p:nvSpPr>
         <p:spPr/>
@@ -13092,12 +13148,12 @@
       </p:sp>
       <p:sp>
         <p:nvSpPr>
-          <p:cNvPr id="6" name="Fußzeilenplatzhalter 5"/>
-          <p:cNvSpPr>
-            <a:spLocks noGrp="1"/>
-          </p:cNvSpPr>
-          <p:nvPr>
-            <p:ph type="ftr" sz="quarter" idx="16"/>
+          <p:cNvPr id="8" name="Fußzeilenplatzhalter 4"/>
+          <p:cNvSpPr>
+            <a:spLocks noGrp="1"/>
+          </p:cNvSpPr>
+          <p:nvPr>
+            <p:ph type="ftr" sz="quarter" idx="12"/>
           </p:nvPr>
         </p:nvSpPr>
         <p:spPr/>
@@ -13106,23 +13162,41 @@
           <a:lstStyle/>
           <a:p>
             <a:r>
-              <a:rPr lang="de-DE" noProof="0"/>
+              <a:rPr lang="de-DE"/>
               <a:t>Dr. rer. nat. Erika Mustermann (TUM) | kann beliebig erweitert werden | Infos mit Strich trennen</a:t>
             </a:r>
-          </a:p>
-        </p:txBody>
-      </p:sp>
-      <p:sp>
-        <p:nvSpPr>
-          <p:cNvPr id="17" name="Bildplatzhalter 16"/>
-          <p:cNvSpPr>
-            <a:spLocks noGrp="1"/>
-          </p:cNvSpPr>
-          <p:nvPr>
-            <p:ph type="pic" sz="quarter" idx="17"/>
+            <a:endParaRPr lang="en-US" dirty="0"/>
+          </a:p>
+        </p:txBody>
+      </p:sp>
+      <p:sp>
+        <p:nvSpPr>
+          <p:cNvPr id="3" name="Textplatzhalter 2"/>
+          <p:cNvSpPr>
+            <a:spLocks noGrp="1"/>
+          </p:cNvSpPr>
+          <p:nvPr>
+            <p:ph type="body" sz="quarter" idx="13"/>
           </p:nvPr>
         </p:nvSpPr>
         <p:spPr/>
+        <p:txBody>
+          <a:bodyPr/>
+          <a:lstStyle/>
+          <a:p>
+            <a:r>
+              <a:rPr lang="de-DE"/>
+              <a:t>Bildbeschreibung</a:t>
+            </a:r>
+            <a:br>
+              <a:rPr lang="de-DE"/>
+            </a:br>
+            <a:r>
+              <a:rPr lang="de-DE"/>
+              <a:t>oberer Bildrand: Begrenzung durch Text</a:t>
+            </a:r>
+          </a:p>
+        </p:txBody>
       </p:sp>
       <p:sp>
         <p:nvSpPr>
@@ -13189,16 +13263,15 @@
           <a:p>
             <a:r>
               <a:rPr lang="de-DE"/>
-              <a:t>Weißer bzw. transparenter Hintergrund</a:t>
+              <a:t>Bildbeschreibung</a:t>
             </a:r>
             <a:br>
               <a:rPr lang="de-DE"/>
             </a:br>
             <a:r>
               <a:rPr lang="de-DE"/>
-              <a:t>mit genug Freiraum anordnen</a:t>
-            </a:r>
-            <a:endParaRPr lang="de-DE" dirty="0"/>
+              <a:t>oberer Bildrand: Begrenzung durch Text</a:t>
+            </a:r>
           </a:p>
         </p:txBody>
       </p:sp>
@@ -13228,7 +13301,7 @@
       </p:sp>
       <p:sp>
         <p:nvSpPr>
-          <p:cNvPr id="10" name="Fußzeilenplatzhalter 4"/>
+          <p:cNvPr id="6" name="Fußzeilenplatzhalter 5"/>
           <p:cNvSpPr>
             <a:spLocks noGrp="1"/>
           </p:cNvSpPr>
@@ -13242,16 +13315,15 @@
           <a:lstStyle/>
           <a:p>
             <a:r>
-              <a:rPr lang="de-DE"/>
+              <a:rPr lang="de-DE" noProof="0"/>
               <a:t>Dr. rer. nat. Erika Mustermann (TUM) | kann beliebig erweitert werden | Infos mit Strich trennen</a:t>
             </a:r>
-            <a:endParaRPr lang="en-US" dirty="0"/>
-          </a:p>
-        </p:txBody>
-      </p:sp>
-      <p:sp>
-        <p:nvSpPr>
-          <p:cNvPr id="18" name="Bildplatzhalter 17"/>
+          </a:p>
+        </p:txBody>
+      </p:sp>
+      <p:sp>
+        <p:nvSpPr>
+          <p:cNvPr id="17" name="Bildplatzhalter 16"/>
           <p:cNvSpPr>
             <a:spLocks noGrp="1"/>
           </p:cNvSpPr>
@@ -13278,7 +13350,7 @@
           <a:p>
             <a:r>
               <a:rPr lang="de-DE"/>
-              <a:t>Nicht formatfüllende Bilder</a:t>
+              <a:t>Bilder</a:t>
             </a:r>
             <a:endParaRPr lang="de-DE" dirty="0"/>
           </a:p>
@@ -13311,19 +13383,37 @@
       </p:grpSpPr>
       <p:sp>
         <p:nvSpPr>
-          <p:cNvPr id="14" name="Bildplatzhalter 13"/>
-          <p:cNvSpPr>
-            <a:spLocks noGrp="1"/>
-          </p:cNvSpPr>
-          <p:nvPr>
-            <p:ph type="pic" sz="quarter" idx="14"/>
+          <p:cNvPr id="3" name="Textplatzhalter 2"/>
+          <p:cNvSpPr>
+            <a:spLocks noGrp="1"/>
+          </p:cNvSpPr>
+          <p:nvPr>
+            <p:ph type="body" sz="quarter" idx="13"/>
           </p:nvPr>
         </p:nvSpPr>
         <p:spPr/>
-      </p:sp>
-      <p:sp>
-        <p:nvSpPr>
-          <p:cNvPr id="4" name="Foliennummernplatzhalter 3"/>
+        <p:txBody>
+          <a:bodyPr/>
+          <a:lstStyle/>
+          <a:p>
+            <a:r>
+              <a:rPr lang="de-DE"/>
+              <a:t>Weißer bzw. transparenter Hintergrund</a:t>
+            </a:r>
+            <a:br>
+              <a:rPr lang="de-DE"/>
+            </a:br>
+            <a:r>
+              <a:rPr lang="de-DE"/>
+              <a:t>mit genug Freiraum anordnen</a:t>
+            </a:r>
+            <a:endParaRPr lang="de-DE" dirty="0"/>
+          </a:p>
+        </p:txBody>
+      </p:sp>
+      <p:sp>
+        <p:nvSpPr>
+          <p:cNvPr id="5" name="Foliennummernplatzhalter 4"/>
           <p:cNvSpPr>
             <a:spLocks noGrp="1"/>
           </p:cNvSpPr>
@@ -13347,7 +13437,7 @@
       </p:sp>
       <p:sp>
         <p:nvSpPr>
-          <p:cNvPr id="5" name="Fußzeilenplatzhalter 4"/>
+          <p:cNvPr id="10" name="Fußzeilenplatzhalter 4"/>
           <p:cNvSpPr>
             <a:spLocks noGrp="1"/>
           </p:cNvSpPr>
@@ -13370,7 +13460,19 @@
       </p:sp>
       <p:sp>
         <p:nvSpPr>
-          <p:cNvPr id="3" name="Titel 2"/>
+          <p:cNvPr id="18" name="Bildplatzhalter 17"/>
+          <p:cNvSpPr>
+            <a:spLocks noGrp="1"/>
+          </p:cNvSpPr>
+          <p:nvPr>
+            <p:ph type="pic" sz="quarter" idx="17"/>
+          </p:nvPr>
+        </p:nvSpPr>
+        <p:spPr/>
+      </p:sp>
+      <p:sp>
+        <p:nvSpPr>
+          <p:cNvPr id="4" name="Titel 3"/>
           <p:cNvSpPr>
             <a:spLocks noGrp="1"/>
           </p:cNvSpPr>
@@ -13385,7 +13487,7 @@
           <a:p>
             <a:r>
               <a:rPr lang="de-DE"/>
-              <a:t>Bilder Format füllend - maximale Bildgröße</a:t>
+              <a:t>Nicht formatfüllende Bilder</a:t>
             </a:r>
             <a:endParaRPr lang="de-DE" dirty="0"/>
           </a:p>
@@ -13418,31 +13520,15 @@
       </p:grpSpPr>
       <p:sp>
         <p:nvSpPr>
-          <p:cNvPr id="2" name="Textplatzhalter 1"/>
-          <p:cNvSpPr>
-            <a:spLocks noGrp="1"/>
-          </p:cNvSpPr>
-          <p:nvPr>
-            <p:ph type="body" sz="quarter" idx="13"/>
+          <p:cNvPr id="14" name="Bildplatzhalter 13"/>
+          <p:cNvSpPr>
+            <a:spLocks noGrp="1"/>
+          </p:cNvSpPr>
+          <p:nvPr>
+            <p:ph type="pic" sz="quarter" idx="14"/>
           </p:nvPr>
         </p:nvSpPr>
         <p:spPr/>
-        <p:txBody>
-          <a:bodyPr/>
-          <a:lstStyle/>
-          <a:p>
-            <a:r>
-              <a:rPr lang="de-DE"/>
-              <a:t>Alternativ mit formatfüllendem Hintergrund: 5 % schwarz</a:t>
-            </a:r>
-          </a:p>
-          <a:p>
-            <a:r>
-              <a:rPr lang="de-DE"/>
-              <a:t>Beschriftungen können zusätzlich neben den Bildern angebracht werden</a:t>
-            </a:r>
-          </a:p>
-        </p:txBody>
       </p:sp>
       <p:sp>
         <p:nvSpPr>
@@ -13470,7 +13556,7 @@
       </p:sp>
       <p:sp>
         <p:nvSpPr>
-          <p:cNvPr id="11" name="Fußzeilenplatzhalter 4"/>
+          <p:cNvPr id="5" name="Fußzeilenplatzhalter 4"/>
           <p:cNvSpPr>
             <a:spLocks noGrp="1"/>
           </p:cNvSpPr>
@@ -13493,12 +13579,12 @@
       </p:sp>
       <p:sp>
         <p:nvSpPr>
-          <p:cNvPr id="7" name="Inhaltsplatzhalter 6"/>
-          <p:cNvSpPr>
-            <a:spLocks noGrp="1"/>
-          </p:cNvSpPr>
-          <p:nvPr>
-            <p:ph sz="quarter" idx="18"/>
+          <p:cNvPr id="3" name="Titel 2"/>
+          <p:cNvSpPr>
+            <a:spLocks noGrp="1"/>
+          </p:cNvSpPr>
+          <p:nvPr>
+            <p:ph type="title"/>
           </p:nvPr>
         </p:nvSpPr>
         <p:spPr/>
@@ -13508,42 +13594,7 @@
           <a:p>
             <a:r>
               <a:rPr lang="de-DE"/>
-              <a:t>Bilderklärung</a:t>
-            </a:r>
-            <a:endParaRPr lang="de-DE" dirty="0"/>
-          </a:p>
-        </p:txBody>
-      </p:sp>
-      <p:sp>
-        <p:nvSpPr>
-          <p:cNvPr id="21" name="Bildplatzhalter 20"/>
-          <p:cNvSpPr>
-            <a:spLocks noGrp="1"/>
-          </p:cNvSpPr>
-          <p:nvPr>
-            <p:ph type="pic" sz="quarter" idx="14"/>
-          </p:nvPr>
-        </p:nvSpPr>
-        <p:spPr/>
-      </p:sp>
-      <p:sp>
-        <p:nvSpPr>
-          <p:cNvPr id="3" name="Titel 2"/>
-          <p:cNvSpPr>
-            <a:spLocks noGrp="1"/>
-          </p:cNvSpPr>
-          <p:nvPr>
-            <p:ph type="title"/>
-          </p:nvPr>
-        </p:nvSpPr>
-        <p:spPr/>
-        <p:txBody>
-          <a:bodyPr/>
-          <a:lstStyle/>
-          <a:p>
-            <a:r>
-              <a:rPr lang="de-DE"/>
-              <a:t>Nicht Format füllende Bilder</a:t>
+              <a:t>Bilder Format füllend - maximale Bildgröße</a:t>
             </a:r>
             <a:endParaRPr lang="de-DE" dirty="0"/>
           </a:p>
@@ -13558,6 +13609,164 @@
 </file>
 
 <file path=ppt/slides/slide27.xml><?xml version="1.0" encoding="utf-8"?>
+<p:sld xmlns:a="http://schemas.openxmlformats.org/drawingml/2006/main" xmlns:r="http://schemas.openxmlformats.org/officeDocument/2006/relationships" xmlns:p="http://schemas.openxmlformats.org/presentationml/2006/main">
+  <p:cSld>
+    <p:spTree>
+      <p:nvGrpSpPr>
+        <p:cNvPr id="1" name=""/>
+        <p:cNvGrpSpPr/>
+        <p:nvPr/>
+      </p:nvGrpSpPr>
+      <p:grpSpPr>
+        <a:xfrm>
+          <a:off x="0" y="0"/>
+          <a:ext cx="0" cy="0"/>
+          <a:chOff x="0" y="0"/>
+          <a:chExt cx="0" cy="0"/>
+        </a:xfrm>
+      </p:grpSpPr>
+      <p:sp>
+        <p:nvSpPr>
+          <p:cNvPr id="2" name="Textplatzhalter 1"/>
+          <p:cNvSpPr>
+            <a:spLocks noGrp="1"/>
+          </p:cNvSpPr>
+          <p:nvPr>
+            <p:ph type="body" sz="quarter" idx="13"/>
+          </p:nvPr>
+        </p:nvSpPr>
+        <p:spPr/>
+        <p:txBody>
+          <a:bodyPr/>
+          <a:lstStyle/>
+          <a:p>
+            <a:r>
+              <a:rPr lang="de-DE"/>
+              <a:t>Alternativ mit formatfüllendem Hintergrund: 5 % schwarz</a:t>
+            </a:r>
+          </a:p>
+          <a:p>
+            <a:r>
+              <a:rPr lang="de-DE"/>
+              <a:t>Beschriftungen können zusätzlich neben den Bildern angebracht werden</a:t>
+            </a:r>
+          </a:p>
+        </p:txBody>
+      </p:sp>
+      <p:sp>
+        <p:nvSpPr>
+          <p:cNvPr id="4" name="Foliennummernplatzhalter 3"/>
+          <p:cNvSpPr>
+            <a:spLocks noGrp="1"/>
+          </p:cNvSpPr>
+          <p:nvPr>
+            <p:ph type="sldNum" sz="quarter" idx="15"/>
+          </p:nvPr>
+        </p:nvSpPr>
+        <p:spPr/>
+        <p:txBody>
+          <a:bodyPr/>
+          <a:lstStyle/>
+          <a:p>
+            <a:fld id="{CE58CB1E-F828-4F11-99E0-327109AF9DA4}" type="slidenum">
+              <a:rPr lang="de-DE" smtClean="0"/>
+              <a:pPr/>
+              <a:t>27</a:t>
+            </a:fld>
+            <a:endParaRPr lang="de-DE" dirty="0"/>
+          </a:p>
+        </p:txBody>
+      </p:sp>
+      <p:sp>
+        <p:nvSpPr>
+          <p:cNvPr id="11" name="Fußzeilenplatzhalter 4"/>
+          <p:cNvSpPr>
+            <a:spLocks noGrp="1"/>
+          </p:cNvSpPr>
+          <p:nvPr>
+            <p:ph type="ftr" sz="quarter" idx="16"/>
+          </p:nvPr>
+        </p:nvSpPr>
+        <p:spPr/>
+        <p:txBody>
+          <a:bodyPr/>
+          <a:lstStyle/>
+          <a:p>
+            <a:r>
+              <a:rPr lang="de-DE"/>
+              <a:t>Dr. rer. nat. Erika Mustermann (TUM) | kann beliebig erweitert werden | Infos mit Strich trennen</a:t>
+            </a:r>
+            <a:endParaRPr lang="en-US" dirty="0"/>
+          </a:p>
+        </p:txBody>
+      </p:sp>
+      <p:sp>
+        <p:nvSpPr>
+          <p:cNvPr id="7" name="Inhaltsplatzhalter 6"/>
+          <p:cNvSpPr>
+            <a:spLocks noGrp="1"/>
+          </p:cNvSpPr>
+          <p:nvPr>
+            <p:ph sz="quarter" idx="18"/>
+          </p:nvPr>
+        </p:nvSpPr>
+        <p:spPr/>
+        <p:txBody>
+          <a:bodyPr/>
+          <a:lstStyle/>
+          <a:p>
+            <a:r>
+              <a:rPr lang="de-DE"/>
+              <a:t>Bilderklärung</a:t>
+            </a:r>
+            <a:endParaRPr lang="de-DE" dirty="0"/>
+          </a:p>
+        </p:txBody>
+      </p:sp>
+      <p:sp>
+        <p:nvSpPr>
+          <p:cNvPr id="21" name="Bildplatzhalter 20"/>
+          <p:cNvSpPr>
+            <a:spLocks noGrp="1"/>
+          </p:cNvSpPr>
+          <p:nvPr>
+            <p:ph type="pic" sz="quarter" idx="14"/>
+          </p:nvPr>
+        </p:nvSpPr>
+        <p:spPr/>
+      </p:sp>
+      <p:sp>
+        <p:nvSpPr>
+          <p:cNvPr id="3" name="Titel 2"/>
+          <p:cNvSpPr>
+            <a:spLocks noGrp="1"/>
+          </p:cNvSpPr>
+          <p:nvPr>
+            <p:ph type="title"/>
+          </p:nvPr>
+        </p:nvSpPr>
+        <p:spPr/>
+        <p:txBody>
+          <a:bodyPr/>
+          <a:lstStyle/>
+          <a:p>
+            <a:r>
+              <a:rPr lang="de-DE"/>
+              <a:t>Nicht Format füllende Bilder</a:t>
+            </a:r>
+            <a:endParaRPr lang="de-DE" dirty="0"/>
+          </a:p>
+        </p:txBody>
+      </p:sp>
+    </p:spTree>
+  </p:cSld>
+  <p:clrMapOvr>
+    <a:masterClrMapping/>
+  </p:clrMapOvr>
+</p:sld>
+</file>
+
+<file path=ppt/slides/slide28.xml><?xml version="1.0" encoding="utf-8"?>
 <p:sld xmlns:a="http://schemas.openxmlformats.org/drawingml/2006/main" xmlns:r="http://schemas.openxmlformats.org/officeDocument/2006/relationships" xmlns:p="http://schemas.openxmlformats.org/presentationml/2006/main">
   <p:cSld>
     <p:spTree>
@@ -14207,7 +14416,7 @@
             <a:fld id="{CE58CB1E-F828-4F11-99E0-327109AF9DA4}" type="slidenum">
               <a:rPr lang="de-DE" smtClean="0"/>
               <a:pPr/>
-              <a:t>27</a:t>
+              <a:t>28</a:t>
             </a:fld>
             <a:endParaRPr lang="de-DE" dirty="0"/>
           </a:p>
@@ -14297,7 +14506,7 @@
 </p:sld>
 </file>
 
-<file path=ppt/slides/slide28.xml><?xml version="1.0" encoding="utf-8"?>
+<file path=ppt/slides/slide29.xml><?xml version="1.0" encoding="utf-8"?>
 <p:sld xmlns:a="http://schemas.openxmlformats.org/drawingml/2006/main" xmlns:r="http://schemas.openxmlformats.org/officeDocument/2006/relationships" xmlns:p="http://schemas.openxmlformats.org/presentationml/2006/main">
   <p:cSld>
     <p:spTree>
@@ -14737,7 +14946,7 @@
             <a:fld id="{CE58CB1E-F828-4F11-99E0-327109AF9DA4}" type="slidenum">
               <a:rPr lang="de-DE" smtClean="0"/>
               <a:pPr/>
-              <a:t>28</a:t>
+              <a:t>29</a:t>
             </a:fld>
             <a:endParaRPr lang="de-DE" dirty="0"/>
           </a:p>
@@ -14819,146 +15028,6 @@
           </a:p>
         </p:txBody>
       </p:sp>
-    </p:spTree>
-  </p:cSld>
-  <p:clrMapOvr>
-    <a:masterClrMapping/>
-  </p:clrMapOvr>
-</p:sld>
-</file>
-
-<file path=ppt/slides/slide29.xml><?xml version="1.0" encoding="utf-8"?>
-<p:sld xmlns:a="http://schemas.openxmlformats.org/drawingml/2006/main" xmlns:r="http://schemas.openxmlformats.org/officeDocument/2006/relationships" xmlns:p="http://schemas.openxmlformats.org/presentationml/2006/main">
-  <p:cSld>
-    <p:spTree>
-      <p:nvGrpSpPr>
-        <p:cNvPr id="1" name=""/>
-        <p:cNvGrpSpPr/>
-        <p:nvPr/>
-      </p:nvGrpSpPr>
-      <p:grpSpPr>
-        <a:xfrm>
-          <a:off x="0" y="0"/>
-          <a:ext cx="0" cy="0"/>
-          <a:chOff x="0" y="0"/>
-          <a:chExt cx="0" cy="0"/>
-        </a:xfrm>
-      </p:grpSpPr>
-      <p:sp>
-        <p:nvSpPr>
-          <p:cNvPr id="5" name="Foliennummernplatzhalter 4"/>
-          <p:cNvSpPr>
-            <a:spLocks noGrp="1"/>
-          </p:cNvSpPr>
-          <p:nvPr>
-            <p:ph type="sldNum" sz="quarter" idx="11"/>
-          </p:nvPr>
-        </p:nvSpPr>
-        <p:spPr/>
-        <p:txBody>
-          <a:bodyPr/>
-          <a:lstStyle/>
-          <a:p>
-            <a:fld id="{CE58CB1E-F828-4F11-99E0-327109AF9DA4}" type="slidenum">
-              <a:rPr lang="de-DE" smtClean="0"/>
-              <a:pPr/>
-              <a:t>29</a:t>
-            </a:fld>
-            <a:endParaRPr lang="de-DE" dirty="0"/>
-          </a:p>
-        </p:txBody>
-      </p:sp>
-      <p:sp>
-        <p:nvSpPr>
-          <p:cNvPr id="9" name="Fußzeilenplatzhalter 4"/>
-          <p:cNvSpPr>
-            <a:spLocks noGrp="1"/>
-          </p:cNvSpPr>
-          <p:nvPr>
-            <p:ph type="ftr" sz="quarter" idx="12"/>
-          </p:nvPr>
-        </p:nvSpPr>
-        <p:spPr/>
-        <p:txBody>
-          <a:bodyPr/>
-          <a:lstStyle/>
-          <a:p>
-            <a:r>
-              <a:rPr lang="de-DE"/>
-              <a:t>Dr. rer. nat. Erika Mustermann (TUM) | kann beliebig erweitert werden | Infos mit Strich trennen</a:t>
-            </a:r>
-            <a:endParaRPr lang="en-US" dirty="0"/>
-          </a:p>
-        </p:txBody>
-      </p:sp>
-      <p:sp>
-        <p:nvSpPr>
-          <p:cNvPr id="3" name="Textplatzhalter 2"/>
-          <p:cNvSpPr>
-            <a:spLocks noGrp="1"/>
-          </p:cNvSpPr>
-          <p:nvPr>
-            <p:ph type="body" sz="quarter" idx="13"/>
-          </p:nvPr>
-        </p:nvSpPr>
-        <p:spPr/>
-        <p:txBody>
-          <a:bodyPr/>
-          <a:lstStyle/>
-          <a:p>
-            <a:r>
-              <a:rPr lang="de-DE" dirty="0"/>
-              <a:t>Nach Möglichkeit linksbündig bleiben</a:t>
-            </a:r>
-            <a:br>
-              <a:rPr lang="de-DE" dirty="0"/>
-            </a:br>
-            <a:r>
-              <a:rPr lang="de-DE" dirty="0"/>
-              <a:t>Unnötige Striche und Balken vermeiden</a:t>
-            </a:r>
-          </a:p>
-        </p:txBody>
-      </p:sp>
-      <p:sp>
-        <p:nvSpPr>
-          <p:cNvPr id="4" name="Titel 3"/>
-          <p:cNvSpPr>
-            <a:spLocks noGrp="1"/>
-          </p:cNvSpPr>
-          <p:nvPr>
-            <p:ph type="title"/>
-          </p:nvPr>
-        </p:nvSpPr>
-        <p:spPr/>
-        <p:txBody>
-          <a:bodyPr/>
-          <a:lstStyle/>
-          <a:p>
-            <a:r>
-              <a:rPr lang="de-DE"/>
-              <a:t>Diagramme – Beispiel 1</a:t>
-            </a:r>
-            <a:endParaRPr lang="de-DE" dirty="0"/>
-          </a:p>
-        </p:txBody>
-      </p:sp>
-      <p:graphicFrame>
-        <p:nvGraphicFramePr>
-          <p:cNvPr id="14" name="Diagramm 13"/>
-          <p:cNvGraphicFramePr/>
-          <p:nvPr/>
-        </p:nvGraphicFramePr>
-        <p:xfrm>
-          <a:off x="209868" y="2388199"/>
-          <a:ext cx="8515032" cy="4207865"/>
-        </p:xfrm>
-        <a:graphic>
-          <a:graphicData uri="http://schemas.openxmlformats.org/drawingml/2006/chart">
-            <c:chart xmlns:c="http://schemas.openxmlformats.org/drawingml/2006/chart" xmlns:r="http://schemas.openxmlformats.org/officeDocument/2006/relationships" r:id="rId2"/>
-          </a:graphicData>
-        </a:graphic>
-      </p:graphicFrame>
     </p:spTree>
   </p:cSld>
   <p:clrMapOvr>
@@ -15057,6 +15126,146 @@
           <a:chExt cx="0" cy="0"/>
         </a:xfrm>
       </p:grpSpPr>
+      <p:sp>
+        <p:nvSpPr>
+          <p:cNvPr id="5" name="Foliennummernplatzhalter 4"/>
+          <p:cNvSpPr>
+            <a:spLocks noGrp="1"/>
+          </p:cNvSpPr>
+          <p:nvPr>
+            <p:ph type="sldNum" sz="quarter" idx="11"/>
+          </p:nvPr>
+        </p:nvSpPr>
+        <p:spPr/>
+        <p:txBody>
+          <a:bodyPr/>
+          <a:lstStyle/>
+          <a:p>
+            <a:fld id="{CE58CB1E-F828-4F11-99E0-327109AF9DA4}" type="slidenum">
+              <a:rPr lang="de-DE" smtClean="0"/>
+              <a:pPr/>
+              <a:t>30</a:t>
+            </a:fld>
+            <a:endParaRPr lang="de-DE" dirty="0"/>
+          </a:p>
+        </p:txBody>
+      </p:sp>
+      <p:sp>
+        <p:nvSpPr>
+          <p:cNvPr id="9" name="Fußzeilenplatzhalter 4"/>
+          <p:cNvSpPr>
+            <a:spLocks noGrp="1"/>
+          </p:cNvSpPr>
+          <p:nvPr>
+            <p:ph type="ftr" sz="quarter" idx="12"/>
+          </p:nvPr>
+        </p:nvSpPr>
+        <p:spPr/>
+        <p:txBody>
+          <a:bodyPr/>
+          <a:lstStyle/>
+          <a:p>
+            <a:r>
+              <a:rPr lang="de-DE"/>
+              <a:t>Dr. rer. nat. Erika Mustermann (TUM) | kann beliebig erweitert werden | Infos mit Strich trennen</a:t>
+            </a:r>
+            <a:endParaRPr lang="en-US" dirty="0"/>
+          </a:p>
+        </p:txBody>
+      </p:sp>
+      <p:sp>
+        <p:nvSpPr>
+          <p:cNvPr id="3" name="Textplatzhalter 2"/>
+          <p:cNvSpPr>
+            <a:spLocks noGrp="1"/>
+          </p:cNvSpPr>
+          <p:nvPr>
+            <p:ph type="body" sz="quarter" idx="13"/>
+          </p:nvPr>
+        </p:nvSpPr>
+        <p:spPr/>
+        <p:txBody>
+          <a:bodyPr/>
+          <a:lstStyle/>
+          <a:p>
+            <a:r>
+              <a:rPr lang="de-DE" dirty="0"/>
+              <a:t>Nach Möglichkeit linksbündig bleiben</a:t>
+            </a:r>
+            <a:br>
+              <a:rPr lang="de-DE" dirty="0"/>
+            </a:br>
+            <a:r>
+              <a:rPr lang="de-DE" dirty="0"/>
+              <a:t>Unnötige Striche und Balken vermeiden</a:t>
+            </a:r>
+          </a:p>
+        </p:txBody>
+      </p:sp>
+      <p:sp>
+        <p:nvSpPr>
+          <p:cNvPr id="4" name="Titel 3"/>
+          <p:cNvSpPr>
+            <a:spLocks noGrp="1"/>
+          </p:cNvSpPr>
+          <p:nvPr>
+            <p:ph type="title"/>
+          </p:nvPr>
+        </p:nvSpPr>
+        <p:spPr/>
+        <p:txBody>
+          <a:bodyPr/>
+          <a:lstStyle/>
+          <a:p>
+            <a:r>
+              <a:rPr lang="de-DE"/>
+              <a:t>Diagramme – Beispiel 1</a:t>
+            </a:r>
+            <a:endParaRPr lang="de-DE" dirty="0"/>
+          </a:p>
+        </p:txBody>
+      </p:sp>
+      <p:graphicFrame>
+        <p:nvGraphicFramePr>
+          <p:cNvPr id="14" name="Diagramm 13"/>
+          <p:cNvGraphicFramePr/>
+          <p:nvPr/>
+        </p:nvGraphicFramePr>
+        <p:xfrm>
+          <a:off x="209868" y="2388199"/>
+          <a:ext cx="8515032" cy="4207865"/>
+        </p:xfrm>
+        <a:graphic>
+          <a:graphicData uri="http://schemas.openxmlformats.org/drawingml/2006/chart">
+            <c:chart xmlns:c="http://schemas.openxmlformats.org/drawingml/2006/chart" xmlns:r="http://schemas.openxmlformats.org/officeDocument/2006/relationships" r:id="rId2"/>
+          </a:graphicData>
+        </a:graphic>
+      </p:graphicFrame>
+    </p:spTree>
+  </p:cSld>
+  <p:clrMapOvr>
+    <a:masterClrMapping/>
+  </p:clrMapOvr>
+</p:sld>
+</file>
+
+<file path=ppt/slides/slide31.xml><?xml version="1.0" encoding="utf-8"?>
+<p:sld xmlns:a="http://schemas.openxmlformats.org/drawingml/2006/main" xmlns:r="http://schemas.openxmlformats.org/officeDocument/2006/relationships" xmlns:p="http://schemas.openxmlformats.org/presentationml/2006/main">
+  <p:cSld>
+    <p:spTree>
+      <p:nvGrpSpPr>
+        <p:cNvPr id="1" name=""/>
+        <p:cNvGrpSpPr/>
+        <p:nvPr/>
+      </p:nvGrpSpPr>
+      <p:grpSpPr>
+        <a:xfrm>
+          <a:off x="0" y="0"/>
+          <a:ext cx="0" cy="0"/>
+          <a:chOff x="0" y="0"/>
+          <a:chExt cx="0" cy="0"/>
+        </a:xfrm>
+      </p:grpSpPr>
       <p:graphicFrame>
         <p:nvGraphicFramePr>
           <p:cNvPr id="6" name="Inhaltsplatzhalter 5"/>
@@ -15100,7 +15309,7 @@
             <a:fld id="{CE58CB1E-F828-4F11-99E0-327109AF9DA4}" type="slidenum">
               <a:rPr lang="de-DE" smtClean="0"/>
               <a:pPr/>
-              <a:t>30</a:t>
+              <a:t>31</a:t>
             </a:fld>
             <a:endParaRPr lang="de-DE" dirty="0"/>
           </a:p>
@@ -15363,12 +15572,99 @@
           <a:chExt cx="0" cy="0"/>
         </a:xfrm>
       </p:grpSpPr>
+      <p:sp>
+        <p:nvSpPr>
+          <p:cNvPr id="3" name="Foliennummernplatzhalter 2">
+            <a:extLst>
+              <a:ext uri="{FF2B5EF4-FFF2-40B4-BE49-F238E27FC236}">
+                <a16:creationId xmlns:a16="http://schemas.microsoft.com/office/drawing/2014/main" id="{3273F3B6-E5B2-4B8B-9B63-9B0B6CCBCE06}"/>
+              </a:ext>
+            </a:extLst>
+          </p:cNvPr>
+          <p:cNvSpPr>
+            <a:spLocks noGrp="1"/>
+          </p:cNvSpPr>
+          <p:nvPr>
+            <p:ph type="sldNum" sz="quarter" idx="11"/>
+          </p:nvPr>
+        </p:nvSpPr>
+        <p:spPr/>
+        <p:txBody>
+          <a:bodyPr/>
+          <a:lstStyle/>
+          <a:p>
+            <a:fld id="{CE58CB1E-F828-4F11-99E0-327109AF9DA4}" type="slidenum">
+              <a:rPr lang="de-DE" smtClean="0"/>
+              <a:pPr/>
+              <a:t>5</a:t>
+            </a:fld>
+            <a:endParaRPr lang="de-DE" dirty="0"/>
+          </a:p>
+        </p:txBody>
+      </p:sp>
+      <p:sp>
+        <p:nvSpPr>
+          <p:cNvPr id="4" name="Fußzeilenplatzhalter 3">
+            <a:extLst>
+              <a:ext uri="{FF2B5EF4-FFF2-40B4-BE49-F238E27FC236}">
+                <a16:creationId xmlns:a16="http://schemas.microsoft.com/office/drawing/2014/main" id="{52DA284E-DC98-4622-9FF5-9BCE2119F11A}"/>
+              </a:ext>
+            </a:extLst>
+          </p:cNvPr>
+          <p:cNvSpPr>
+            <a:spLocks noGrp="1"/>
+          </p:cNvSpPr>
+          <p:nvPr>
+            <p:ph type="ftr" sz="quarter" idx="12"/>
+          </p:nvPr>
+        </p:nvSpPr>
+        <p:spPr/>
+        <p:txBody>
+          <a:bodyPr/>
+          <a:lstStyle/>
+          <a:p>
+            <a:r>
+              <a:rPr lang="de-DE"/>
+              <a:t>Dr. rer. nat. Erika Mustermann (TUM) | kann beliebig erweitert werden | Infos mit Strich trennen</a:t>
+            </a:r>
+            <a:endParaRPr lang="en-US" dirty="0"/>
+          </a:p>
+        </p:txBody>
+      </p:sp>
+      <p:sp>
+        <p:nvSpPr>
+          <p:cNvPr id="5" name="Titel 4">
+            <a:extLst>
+              <a:ext uri="{FF2B5EF4-FFF2-40B4-BE49-F238E27FC236}">
+                <a16:creationId xmlns:a16="http://schemas.microsoft.com/office/drawing/2014/main" id="{BA07BC16-0D05-4442-ADA3-9D154BBD2484}"/>
+              </a:ext>
+            </a:extLst>
+          </p:cNvPr>
+          <p:cNvSpPr>
+            <a:spLocks noGrp="1"/>
+          </p:cNvSpPr>
+          <p:nvPr>
+            <p:ph type="title"/>
+          </p:nvPr>
+        </p:nvSpPr>
+        <p:spPr/>
+        <p:txBody>
+          <a:bodyPr/>
+          <a:lstStyle/>
+          <a:p>
+            <a:r>
+              <a:rPr lang="de-DE" dirty="0"/>
+              <a:t>UML Klassendiagram</a:t>
+            </a:r>
+          </a:p>
+        </p:txBody>
+      </p:sp>
       <p:pic>
         <p:nvPicPr>
-          <p:cNvPr id="7" name="Inhaltsplatzhalter 6" descr="Ein Bild, das Text, Karte enthält.&#10;&#10;Automatisch generierte Beschreibung">
+          <p:cNvPr id="9" name="Inhaltsplatzhalter 8" descr="Ein Bild, das Text, Karte enthält.&#10;&#10;Automatisch generierte Beschreibung">
             <a:extLst>
               <a:ext uri="{FF2B5EF4-FFF2-40B4-BE49-F238E27FC236}">
-                <a16:creationId xmlns:a16="http://schemas.microsoft.com/office/drawing/2014/main" id="{E777BD71-DF0D-4856-A779-DA2686029380}"/>
+                <a16:creationId xmlns:a16="http://schemas.microsoft.com/office/drawing/2014/main" id="{4DBADF42-C17D-44E6-B0A9-918FCC0BC112}"/>
               </a:ext>
             </a:extLst>
           </p:cNvPr>
@@ -15387,98 +15683,11 @@
         </p:blipFill>
         <p:spPr>
           <a:xfrm>
-            <a:off x="1878146" y="1774313"/>
+            <a:off x="1879734" y="1762125"/>
             <a:ext cx="5387708" cy="4699000"/>
           </a:xfrm>
         </p:spPr>
       </p:pic>
-      <p:sp>
-        <p:nvSpPr>
-          <p:cNvPr id="3" name="Foliennummernplatzhalter 2">
-            <a:extLst>
-              <a:ext uri="{FF2B5EF4-FFF2-40B4-BE49-F238E27FC236}">
-                <a16:creationId xmlns:a16="http://schemas.microsoft.com/office/drawing/2014/main" id="{3273F3B6-E5B2-4B8B-9B63-9B0B6CCBCE06}"/>
-              </a:ext>
-            </a:extLst>
-          </p:cNvPr>
-          <p:cNvSpPr>
-            <a:spLocks noGrp="1"/>
-          </p:cNvSpPr>
-          <p:nvPr>
-            <p:ph type="sldNum" sz="quarter" idx="11"/>
-          </p:nvPr>
-        </p:nvSpPr>
-        <p:spPr/>
-        <p:txBody>
-          <a:bodyPr/>
-          <a:lstStyle/>
-          <a:p>
-            <a:fld id="{CE58CB1E-F828-4F11-99E0-327109AF9DA4}" type="slidenum">
-              <a:rPr lang="de-DE" smtClean="0"/>
-              <a:pPr/>
-              <a:t>5</a:t>
-            </a:fld>
-            <a:endParaRPr lang="de-DE" dirty="0"/>
-          </a:p>
-        </p:txBody>
-      </p:sp>
-      <p:sp>
-        <p:nvSpPr>
-          <p:cNvPr id="4" name="Fußzeilenplatzhalter 3">
-            <a:extLst>
-              <a:ext uri="{FF2B5EF4-FFF2-40B4-BE49-F238E27FC236}">
-                <a16:creationId xmlns:a16="http://schemas.microsoft.com/office/drawing/2014/main" id="{52DA284E-DC98-4622-9FF5-9BCE2119F11A}"/>
-              </a:ext>
-            </a:extLst>
-          </p:cNvPr>
-          <p:cNvSpPr>
-            <a:spLocks noGrp="1"/>
-          </p:cNvSpPr>
-          <p:nvPr>
-            <p:ph type="ftr" sz="quarter" idx="12"/>
-          </p:nvPr>
-        </p:nvSpPr>
-        <p:spPr/>
-        <p:txBody>
-          <a:bodyPr/>
-          <a:lstStyle/>
-          <a:p>
-            <a:r>
-              <a:rPr lang="de-DE"/>
-              <a:t>Dr. rer. nat. Erika Mustermann (TUM) | kann beliebig erweitert werden | Infos mit Strich trennen</a:t>
-            </a:r>
-            <a:endParaRPr lang="en-US" dirty="0"/>
-          </a:p>
-        </p:txBody>
-      </p:sp>
-      <p:sp>
-        <p:nvSpPr>
-          <p:cNvPr id="5" name="Titel 4">
-            <a:extLst>
-              <a:ext uri="{FF2B5EF4-FFF2-40B4-BE49-F238E27FC236}">
-                <a16:creationId xmlns:a16="http://schemas.microsoft.com/office/drawing/2014/main" id="{BA07BC16-0D05-4442-ADA3-9D154BBD2484}"/>
-              </a:ext>
-            </a:extLst>
-          </p:cNvPr>
-          <p:cNvSpPr>
-            <a:spLocks noGrp="1"/>
-          </p:cNvSpPr>
-          <p:nvPr>
-            <p:ph type="title"/>
-          </p:nvPr>
-        </p:nvSpPr>
-        <p:spPr/>
-        <p:txBody>
-          <a:bodyPr/>
-          <a:lstStyle/>
-          <a:p>
-            <a:r>
-              <a:rPr lang="de-DE" dirty="0"/>
-              <a:t>UML Klassendiagram</a:t>
-            </a:r>
-          </a:p>
-        </p:txBody>
-      </p:sp>
     </p:spTree>
     <p:extLst>
       <p:ext uri="{BB962C8B-B14F-4D97-AF65-F5344CB8AC3E}">
@@ -15522,7 +15731,7 @@
             <a:spLocks noGrp="1"/>
           </p:cNvSpPr>
           <p:nvPr>
-            <p:ph idx="1"/>
+            <p:ph idx="14"/>
           </p:nvPr>
         </p:nvSpPr>
         <p:spPr/>
@@ -15586,6 +15795,35 @@
           </a:p>
         </p:txBody>
       </p:sp>
+      <p:pic>
+        <p:nvPicPr>
+          <p:cNvPr id="9" name="Bildplatzhalter 8" descr="Ein Bild, das Screenshot enthält.&#10;&#10;Automatisch generierte Beschreibung">
+            <a:extLst>
+              <a:ext uri="{FF2B5EF4-FFF2-40B4-BE49-F238E27FC236}">
+                <a16:creationId xmlns:a16="http://schemas.microsoft.com/office/drawing/2014/main" id="{96EDE67A-1647-4A86-B490-E3F4B936FE0E}"/>
+              </a:ext>
+            </a:extLst>
+          </p:cNvPr>
+          <p:cNvPicPr>
+            <a:picLocks noGrp="1" noChangeAspect="1"/>
+          </p:cNvPicPr>
+          <p:nvPr>
+            <p:ph idx="15"/>
+          </p:nvPr>
+        </p:nvPicPr>
+        <p:blipFill>
+          <a:blip r:embed="rId2"/>
+          <a:stretch>
+            <a:fillRect/>
+          </a:stretch>
+        </p:blipFill>
+        <p:spPr>
+          <a:xfrm>
+            <a:off x="5809968" y="1762188"/>
+            <a:ext cx="1991003" cy="1867161"/>
+          </a:xfrm>
+        </p:spPr>
+      </p:pic>
       <p:sp>
         <p:nvSpPr>
           <p:cNvPr id="3" name="Foliennummernplatzhalter 2">
@@ -15599,7 +15837,7 @@
             <a:spLocks noGrp="1"/>
           </p:cNvSpPr>
           <p:nvPr>
-            <p:ph type="sldNum" sz="quarter" idx="11"/>
+            <p:ph type="sldNum" sz="quarter" idx="16"/>
           </p:nvPr>
         </p:nvSpPr>
         <p:spPr/>
@@ -15629,7 +15867,7 @@
             <a:spLocks noGrp="1"/>
           </p:cNvSpPr>
           <p:nvPr>
-            <p:ph type="ftr" sz="quarter" idx="12"/>
+            <p:ph type="ftr" sz="quarter" idx="17"/>
           </p:nvPr>
         </p:nvSpPr>
         <p:spPr/>
@@ -15716,7 +15954,7 @@
             <a:spLocks noGrp="1"/>
           </p:cNvSpPr>
           <p:nvPr>
-            <p:ph idx="1"/>
+            <p:ph idx="14"/>
           </p:nvPr>
         </p:nvSpPr>
         <p:spPr/>
@@ -15816,34 +16054,39 @@
             </a:r>
           </a:p>
           <a:p>
-            <a:pPr marL="285750" indent="-285750">
-              <a:buFont typeface="Arial" panose="020B0604020202020204" pitchFamily="34" charset="0"/>
-              <a:buChar char="•"/>
-            </a:pPr>
-            <a:r>
-              <a:rPr lang="de-DE" dirty="0"/>
-              <a:t>Dealer hat das Deck</a:t>
-            </a:r>
-          </a:p>
-          <a:p>
-            <a:pPr marL="285750" indent="-285750">
-              <a:buFont typeface="Arial" panose="020B0604020202020204" pitchFamily="34" charset="0"/>
-              <a:buChar char="•"/>
-            </a:pPr>
-            <a:r>
-              <a:rPr lang="de-DE" dirty="0"/>
-              <a:t>Unterschiede zur Player Klasse</a:t>
-            </a:r>
-          </a:p>
-          <a:p>
-            <a:pPr marL="285750" indent="-285750">
-              <a:buFont typeface="Arial" panose="020B0604020202020204" pitchFamily="34" charset="0"/>
-              <a:buChar char="•"/>
-            </a:pPr>
             <a:endParaRPr lang="de-DE" dirty="0"/>
           </a:p>
         </p:txBody>
       </p:sp>
+      <p:pic>
+        <p:nvPicPr>
+          <p:cNvPr id="8" name="Inhaltsplatzhalter 7" descr="Ein Bild, das Screenshot enthält.&#10;&#10;Automatisch generierte Beschreibung">
+            <a:extLst>
+              <a:ext uri="{FF2B5EF4-FFF2-40B4-BE49-F238E27FC236}">
+                <a16:creationId xmlns:a16="http://schemas.microsoft.com/office/drawing/2014/main" id="{2323238E-B959-44A9-AD1D-ACFE58D1B583}"/>
+              </a:ext>
+            </a:extLst>
+          </p:cNvPr>
+          <p:cNvPicPr>
+            <a:picLocks noGrp="1" noChangeAspect="1"/>
+          </p:cNvPicPr>
+          <p:nvPr>
+            <p:ph idx="15"/>
+          </p:nvPr>
+        </p:nvPicPr>
+        <p:blipFill>
+          <a:blip r:embed="rId2"/>
+          <a:stretch>
+            <a:fillRect/>
+          </a:stretch>
+        </p:blipFill>
+        <p:spPr>
+          <a:xfrm>
+            <a:off x="5783810" y="1762125"/>
+            <a:ext cx="1907080" cy="4687888"/>
+          </a:xfrm>
+        </p:spPr>
+      </p:pic>
       <p:sp>
         <p:nvSpPr>
           <p:cNvPr id="3" name="Foliennummernplatzhalter 2">
@@ -15857,7 +16100,7 @@
             <a:spLocks noGrp="1"/>
           </p:cNvSpPr>
           <p:nvPr>
-            <p:ph type="sldNum" sz="quarter" idx="11"/>
+            <p:ph type="sldNum" sz="quarter" idx="16"/>
           </p:nvPr>
         </p:nvSpPr>
         <p:spPr/>
@@ -15887,7 +16130,7 @@
             <a:spLocks noGrp="1"/>
           </p:cNvSpPr>
           <p:nvPr>
-            <p:ph type="ftr" sz="quarter" idx="12"/>
+            <p:ph type="ftr" sz="quarter" idx="17"/>
           </p:nvPr>
         </p:nvSpPr>
         <p:spPr/>
@@ -15970,7 +16213,7 @@
           <p:cNvPr id="2" name="Inhaltsplatzhalter 1">
             <a:extLst>
               <a:ext uri="{FF2B5EF4-FFF2-40B4-BE49-F238E27FC236}">
-                <a16:creationId xmlns:a16="http://schemas.microsoft.com/office/drawing/2014/main" id="{8F91A5C9-007F-4E52-9B41-C482B0B3A6D7}"/>
+                <a16:creationId xmlns:a16="http://schemas.microsoft.com/office/drawing/2014/main" id="{98E478E7-93FC-4F48-B612-8EFD7909BDE4}"/>
               </a:ext>
             </a:extLst>
           </p:cNvPr>
@@ -15978,7 +16221,7 @@
             <a:spLocks noGrp="1"/>
           </p:cNvSpPr>
           <p:nvPr>
-            <p:ph idx="1"/>
+            <p:ph idx="14"/>
           </p:nvPr>
         </p:nvSpPr>
         <p:spPr/>
@@ -15992,7 +16235,7 @@
             </a:pPr>
             <a:r>
               <a:rPr lang="de-DE" dirty="0"/>
-              <a:t>Deck besitzt alle nicht gezogenen Karten („realistisches Deck“)</a:t>
+              <a:t>Dealer hat das Deck</a:t>
             </a:r>
           </a:p>
           <a:p>
@@ -16002,83 +16245,57 @@
             </a:pPr>
             <a:r>
               <a:rPr lang="de-DE" dirty="0"/>
-              <a:t>Funktionalität: Mischen und Karten ziehen</a:t>
-            </a:r>
-          </a:p>
-          <a:p>
-            <a:pPr marL="285750" indent="-285750">
-              <a:buFont typeface="Arial" panose="020B0604020202020204" pitchFamily="34" charset="0"/>
-              <a:buChar char="•"/>
-            </a:pPr>
-            <a:r>
-              <a:rPr lang="de-DE" dirty="0"/>
-              <a:t>Mögliche Erweiterung: mehrere Decks (</a:t>
-            </a:r>
-            <a:r>
-              <a:rPr lang="de-DE" dirty="0" err="1"/>
-              <a:t>zB</a:t>
-            </a:r>
-            <a:r>
-              <a:rPr lang="de-DE" dirty="0"/>
-              <a:t>. Für jeden Spieler ein eigenes)</a:t>
-            </a:r>
-          </a:p>
-          <a:p>
-            <a:pPr marL="285750" indent="-285750">
-              <a:buFont typeface="Arial" panose="020B0604020202020204" pitchFamily="34" charset="0"/>
-              <a:buChar char="•"/>
-            </a:pPr>
-            <a:r>
-              <a:rPr lang="de-DE" dirty="0"/>
-              <a:t>Hand hat alle Karten des Spieler/Dealers</a:t>
-            </a:r>
-          </a:p>
-          <a:p>
-            <a:pPr marL="285750" indent="-285750">
-              <a:buFont typeface="Arial" panose="020B0604020202020204" pitchFamily="34" charset="0"/>
-              <a:buChar char="•"/>
-            </a:pPr>
-            <a:r>
-              <a:rPr lang="de-DE" dirty="0"/>
-              <a:t>Funktionalität: einfache Auswertung der Karten eines Spielers/Dealers</a:t>
-            </a:r>
-          </a:p>
-          <a:p>
-            <a:pPr marL="285750" indent="-285750">
-              <a:buFont typeface="Arial" panose="020B0604020202020204" pitchFamily="34" charset="0"/>
-              <a:buChar char="•"/>
-            </a:pPr>
-            <a:r>
-              <a:rPr lang="de-DE" dirty="0"/>
-              <a:t>Mögliche Erweiterung: Implementierung von Split -&gt; 2 Hände</a:t>
-            </a:r>
-          </a:p>
-          <a:p>
-            <a:pPr marL="285750" indent="-285750">
-              <a:buFont typeface="Arial" panose="020B0604020202020204" pitchFamily="34" charset="0"/>
-              <a:buChar char="•"/>
-            </a:pPr>
-            <a:r>
-              <a:rPr lang="de-DE" dirty="0"/>
-              <a:t>Card besitzt Value und Farbe</a:t>
-            </a:r>
-          </a:p>
-        </p:txBody>
-      </p:sp>
-      <p:sp>
-        <p:nvSpPr>
-          <p:cNvPr id="3" name="Foliennummernplatzhalter 2">
+              <a:t>Unterschiede zur Player Klasse</a:t>
+            </a:r>
+          </a:p>
+          <a:p>
+            <a:endParaRPr lang="de-DE" dirty="0"/>
+          </a:p>
+        </p:txBody>
+      </p:sp>
+      <p:pic>
+        <p:nvPicPr>
+          <p:cNvPr id="8" name="Inhaltsplatzhalter 7" descr="Ein Bild, das Screenshot enthält.&#10;&#10;Automatisch generierte Beschreibung">
             <a:extLst>
               <a:ext uri="{FF2B5EF4-FFF2-40B4-BE49-F238E27FC236}">
-                <a16:creationId xmlns:a16="http://schemas.microsoft.com/office/drawing/2014/main" id="{F6FC8C6C-ACDA-4AB3-8A1F-D50331A9D70D}"/>
+                <a16:creationId xmlns:a16="http://schemas.microsoft.com/office/drawing/2014/main" id="{E06D121D-F4A4-4F53-B0D8-61E4B3E7F74F}"/>
               </a:ext>
             </a:extLst>
           </p:cNvPr>
-          <p:cNvSpPr>
-            <a:spLocks noGrp="1"/>
-          </p:cNvSpPr>
-          <p:nvPr>
-            <p:ph type="sldNum" sz="quarter" idx="11"/>
+          <p:cNvPicPr>
+            <a:picLocks noGrp="1" noChangeAspect="1"/>
+          </p:cNvPicPr>
+          <p:nvPr>
+            <p:ph idx="15"/>
+          </p:nvPr>
+        </p:nvPicPr>
+        <p:blipFill>
+          <a:blip r:embed="rId2"/>
+          <a:stretch>
+            <a:fillRect/>
+          </a:stretch>
+        </p:blipFill>
+        <p:spPr>
+          <a:xfrm>
+            <a:off x="6046170" y="3348375"/>
+            <a:ext cx="1457528" cy="1181265"/>
+          </a:xfrm>
+        </p:spPr>
+      </p:pic>
+      <p:sp>
+        <p:nvSpPr>
+          <p:cNvPr id="4" name="Foliennummernplatzhalter 3">
+            <a:extLst>
+              <a:ext uri="{FF2B5EF4-FFF2-40B4-BE49-F238E27FC236}">
+                <a16:creationId xmlns:a16="http://schemas.microsoft.com/office/drawing/2014/main" id="{DF19DEBD-7037-4014-827A-490DD4CB0164}"/>
+              </a:ext>
+            </a:extLst>
+          </p:cNvPr>
+          <p:cNvSpPr>
+            <a:spLocks noGrp="1"/>
+          </p:cNvSpPr>
+          <p:nvPr>
+            <p:ph type="sldNum" sz="quarter" idx="16"/>
           </p:nvPr>
         </p:nvSpPr>
         <p:spPr/>
@@ -16097,10 +16314,10 @@
       </p:sp>
       <p:sp>
         <p:nvSpPr>
-          <p:cNvPr id="4" name="Fußzeilenplatzhalter 3">
+          <p:cNvPr id="5" name="Fußzeilenplatzhalter 4">
             <a:extLst>
               <a:ext uri="{FF2B5EF4-FFF2-40B4-BE49-F238E27FC236}">
-                <a16:creationId xmlns:a16="http://schemas.microsoft.com/office/drawing/2014/main" id="{A493D086-94ED-4D8F-A1B4-E43E25BC8974}"/>
+                <a16:creationId xmlns:a16="http://schemas.microsoft.com/office/drawing/2014/main" id="{CA388F7C-52DD-440E-B621-3BB14FADE536}"/>
               </a:ext>
             </a:extLst>
           </p:cNvPr>
@@ -16108,7 +16325,7 @@
             <a:spLocks noGrp="1"/>
           </p:cNvSpPr>
           <p:nvPr>
-            <p:ph type="ftr" sz="quarter" idx="12"/>
+            <p:ph type="ftr" sz="quarter" idx="17"/>
           </p:nvPr>
         </p:nvSpPr>
         <p:spPr/>
@@ -16126,10 +16343,10 @@
       </p:sp>
       <p:sp>
         <p:nvSpPr>
-          <p:cNvPr id="5" name="Titel 4">
+          <p:cNvPr id="6" name="Titel 5">
             <a:extLst>
               <a:ext uri="{FF2B5EF4-FFF2-40B4-BE49-F238E27FC236}">
-                <a16:creationId xmlns:a16="http://schemas.microsoft.com/office/drawing/2014/main" id="{C538F3DC-4113-4FE7-8D93-77CED857B634}"/>
+                <a16:creationId xmlns:a16="http://schemas.microsoft.com/office/drawing/2014/main" id="{725E3D07-D449-4DDD-87F6-1386462B9302}"/>
               </a:ext>
             </a:extLst>
           </p:cNvPr>
@@ -16146,8 +16363,12 @@
           <a:lstStyle/>
           <a:p>
             <a:r>
+              <a:rPr lang="de-DE" dirty="0" err="1"/>
+              <a:t>Usr</a:t>
+            </a:r>
+            <a:r>
               <a:rPr lang="de-DE" dirty="0"/>
-              <a:t>Deck &amp; Hand &amp; Card</a:t>
+              <a:t> &amp; Player &amp; Dealer</a:t>
             </a:r>
           </a:p>
         </p:txBody>
@@ -16155,7 +16376,7 @@
     </p:spTree>
     <p:extLst>
       <p:ext uri="{BB962C8B-B14F-4D97-AF65-F5344CB8AC3E}">
-        <p14:creationId xmlns:p14="http://schemas.microsoft.com/office/powerpoint/2010/main" val="1165790011"/>
+        <p14:creationId xmlns:p14="http://schemas.microsoft.com/office/powerpoint/2010/main" val="468698100"/>
       </p:ext>
     </p:extLst>
   </p:cSld>
@@ -16187,7 +16408,7 @@
           <p:cNvPr id="2" name="Inhaltsplatzhalter 1">
             <a:extLst>
               <a:ext uri="{FF2B5EF4-FFF2-40B4-BE49-F238E27FC236}">
-                <a16:creationId xmlns:a16="http://schemas.microsoft.com/office/drawing/2014/main" id="{DB7CA37A-7A2C-41B9-B688-25C8CC3A05A6}"/>
+                <a16:creationId xmlns:a16="http://schemas.microsoft.com/office/drawing/2014/main" id="{8F91A5C9-007F-4E52-9B41-C482B0B3A6D7}"/>
               </a:ext>
             </a:extLst>
           </p:cNvPr>
@@ -16195,7 +16416,7 @@
             <a:spLocks noGrp="1"/>
           </p:cNvSpPr>
           <p:nvPr>
-            <p:ph idx="1"/>
+            <p:ph idx="14"/>
           </p:nvPr>
         </p:nvSpPr>
         <p:spPr/>
@@ -16209,7 +16430,7 @@
             </a:pPr>
             <a:r>
               <a:rPr lang="de-DE" dirty="0"/>
-              <a:t>Extra Feature</a:t>
+              <a:t>Deck besitzt alle nicht gezogenen Karten („realistisches Deck“)</a:t>
             </a:r>
           </a:p>
           <a:p>
@@ -16219,7 +16440,7 @@
             </a:pPr>
             <a:r>
               <a:rPr lang="de-DE" dirty="0"/>
-              <a:t>Sinnvoll da Multiplayer über lokales Netzwerk</a:t>
+              <a:t>Funktionalität: Mischen und Karten ziehen</a:t>
             </a:r>
           </a:p>
           <a:p>
@@ -16229,7 +16450,15 @@
             </a:pPr>
             <a:r>
               <a:rPr lang="de-DE" dirty="0"/>
-              <a:t>Spieler können miteinander kommunizieren</a:t>
+              <a:t>Mögliche Erweiterung: mehrere Decks (</a:t>
+            </a:r>
+            <a:r>
+              <a:rPr lang="de-DE" dirty="0" err="1"/>
+              <a:t>zB</a:t>
+            </a:r>
+            <a:r>
+              <a:rPr lang="de-DE" dirty="0"/>
+              <a:t>. Für jeden Spieler ein eigenes)</a:t>
             </a:r>
           </a:p>
           <a:p>
@@ -16239,17 +16468,76 @@
             </a:pPr>
             <a:r>
               <a:rPr lang="de-DE" dirty="0"/>
-              <a:t>Information wenn andere Spieler beitreten oder das Spiel verlassen</a:t>
-            </a:r>
-          </a:p>
-        </p:txBody>
-      </p:sp>
+              <a:t>Hand hat alle Karten des Spieler/Dealers</a:t>
+            </a:r>
+          </a:p>
+          <a:p>
+            <a:pPr marL="285750" indent="-285750">
+              <a:buFont typeface="Arial" panose="020B0604020202020204" pitchFamily="34" charset="0"/>
+              <a:buChar char="•"/>
+            </a:pPr>
+            <a:r>
+              <a:rPr lang="de-DE" dirty="0"/>
+              <a:t>Funktionalität: einfache Auswertung der Karten eines Spielers/Dealers</a:t>
+            </a:r>
+          </a:p>
+          <a:p>
+            <a:pPr marL="285750" indent="-285750">
+              <a:buFont typeface="Arial" panose="020B0604020202020204" pitchFamily="34" charset="0"/>
+              <a:buChar char="•"/>
+            </a:pPr>
+            <a:r>
+              <a:rPr lang="de-DE" dirty="0"/>
+              <a:t>Mögliche Erweiterung: Implementierung von Split -&gt; 2 Hände</a:t>
+            </a:r>
+          </a:p>
+          <a:p>
+            <a:pPr marL="285750" indent="-285750">
+              <a:buFont typeface="Arial" panose="020B0604020202020204" pitchFamily="34" charset="0"/>
+              <a:buChar char="•"/>
+            </a:pPr>
+            <a:r>
+              <a:rPr lang="de-DE" dirty="0"/>
+              <a:t>Card besitzt Value und Farbe</a:t>
+            </a:r>
+          </a:p>
+        </p:txBody>
+      </p:sp>
+      <p:pic>
+        <p:nvPicPr>
+          <p:cNvPr id="8" name="Inhaltsplatzhalter 7" descr="Ein Bild, das Screenshot enthält.&#10;&#10;Automatisch generierte Beschreibung">
+            <a:extLst>
+              <a:ext uri="{FF2B5EF4-FFF2-40B4-BE49-F238E27FC236}">
+                <a16:creationId xmlns:a16="http://schemas.microsoft.com/office/drawing/2014/main" id="{29001AB5-1A5C-4D75-B799-841C2F04FB7B}"/>
+              </a:ext>
+            </a:extLst>
+          </p:cNvPr>
+          <p:cNvPicPr>
+            <a:picLocks noGrp="1" noChangeAspect="1"/>
+          </p:cNvPicPr>
+          <p:nvPr>
+            <p:ph idx="15"/>
+          </p:nvPr>
+        </p:nvPicPr>
+        <p:blipFill>
+          <a:blip r:embed="rId2"/>
+          <a:stretch>
+            <a:fillRect/>
+          </a:stretch>
+        </p:blipFill>
+        <p:spPr>
+          <a:xfrm>
+            <a:off x="4684426" y="2377040"/>
+            <a:ext cx="4105848" cy="3458058"/>
+          </a:xfrm>
+        </p:spPr>
+      </p:pic>
       <p:sp>
         <p:nvSpPr>
           <p:cNvPr id="3" name="Foliennummernplatzhalter 2">
             <a:extLst>
               <a:ext uri="{FF2B5EF4-FFF2-40B4-BE49-F238E27FC236}">
-                <a16:creationId xmlns:a16="http://schemas.microsoft.com/office/drawing/2014/main" id="{AD81C2EF-FD85-4A18-8F03-A0DBBCD700AD}"/>
+                <a16:creationId xmlns:a16="http://schemas.microsoft.com/office/drawing/2014/main" id="{F6FC8C6C-ACDA-4AB3-8A1F-D50331A9D70D}"/>
               </a:ext>
             </a:extLst>
           </p:cNvPr>
@@ -16257,7 +16545,7 @@
             <a:spLocks noGrp="1"/>
           </p:cNvSpPr>
           <p:nvPr>
-            <p:ph type="sldNum" sz="quarter" idx="11"/>
+            <p:ph type="sldNum" sz="quarter" idx="16"/>
           </p:nvPr>
         </p:nvSpPr>
         <p:spPr/>
@@ -16279,7 +16567,7 @@
           <p:cNvPr id="4" name="Fußzeilenplatzhalter 3">
             <a:extLst>
               <a:ext uri="{FF2B5EF4-FFF2-40B4-BE49-F238E27FC236}">
-                <a16:creationId xmlns:a16="http://schemas.microsoft.com/office/drawing/2014/main" id="{E82CB60E-E2AB-41CB-8A71-7BFD43B8921B}"/>
+                <a16:creationId xmlns:a16="http://schemas.microsoft.com/office/drawing/2014/main" id="{A493D086-94ED-4D8F-A1B4-E43E25BC8974}"/>
               </a:ext>
             </a:extLst>
           </p:cNvPr>
@@ -16287,7 +16575,7 @@
             <a:spLocks noGrp="1"/>
           </p:cNvSpPr>
           <p:nvPr>
-            <p:ph type="ftr" sz="quarter" idx="12"/>
+            <p:ph type="ftr" sz="quarter" idx="17"/>
           </p:nvPr>
         </p:nvSpPr>
         <p:spPr/>
@@ -16308,7 +16596,7 @@
           <p:cNvPr id="5" name="Titel 4">
             <a:extLst>
               <a:ext uri="{FF2B5EF4-FFF2-40B4-BE49-F238E27FC236}">
-                <a16:creationId xmlns:a16="http://schemas.microsoft.com/office/drawing/2014/main" id="{38CE14CC-717B-4282-83BB-3662A9B1DD62}"/>
+                <a16:creationId xmlns:a16="http://schemas.microsoft.com/office/drawing/2014/main" id="{C538F3DC-4113-4FE7-8D93-77CED857B634}"/>
               </a:ext>
             </a:extLst>
           </p:cNvPr>
@@ -16326,7 +16614,7 @@
           <a:p>
             <a:r>
               <a:rPr lang="de-DE" dirty="0"/>
-              <a:t>Chat &amp; Message</a:t>
+              <a:t>Deck &amp; Hand &amp; Card</a:t>
             </a:r>
           </a:p>
         </p:txBody>
@@ -16334,7 +16622,7 @@
     </p:spTree>
     <p:extLst>
       <p:ext uri="{BB962C8B-B14F-4D97-AF65-F5344CB8AC3E}">
-        <p14:creationId xmlns:p14="http://schemas.microsoft.com/office/powerpoint/2010/main" val="1120331300"/>
+        <p14:creationId xmlns:p14="http://schemas.microsoft.com/office/powerpoint/2010/main" val="1165790011"/>
       </p:ext>
     </p:extLst>
   </p:cSld>

</xml_diff>

<commit_message>
password usr in uml and slides
</commit_message>
<xml_diff>
--- a/presentation/Präsentation.pptx
+++ b/presentation/Präsentation.pptx
@@ -1055,7 +1055,7 @@
               <a:pPr>
                 <a:defRPr/>
               </a:pPr>
-              <a:t>09/08/2019</a:t>
+              <a:t>12/08/2019</a:t>
             </a:fld>
             <a:endParaRPr lang="en-GB" dirty="0"/>
           </a:p>
@@ -1274,7 +1274,7 @@
               <a:pPr>
                 <a:defRPr/>
               </a:pPr>
-              <a:t>09/08/2019</a:t>
+              <a:t>12/08/2019</a:t>
             </a:fld>
             <a:endParaRPr lang="en-GB"/>
           </a:p>
@@ -15661,10 +15661,10 @@
       </p:sp>
       <p:pic>
         <p:nvPicPr>
-          <p:cNvPr id="9" name="Inhaltsplatzhalter 8" descr="Ein Bild, das Text, Karte enthält.&#10;&#10;Automatisch generierte Beschreibung">
+          <p:cNvPr id="8" name="Inhaltsplatzhalter 7" descr="Ein Bild, das Text, Karte enthält.&#10;&#10;Automatisch generierte Beschreibung">
             <a:extLst>
               <a:ext uri="{FF2B5EF4-FFF2-40B4-BE49-F238E27FC236}">
-                <a16:creationId xmlns:a16="http://schemas.microsoft.com/office/drawing/2014/main" id="{4DBADF42-C17D-44E6-B0A9-918FCC0BC112}"/>
+                <a16:creationId xmlns:a16="http://schemas.microsoft.com/office/drawing/2014/main" id="{A568010D-9180-4E9B-B6DE-E401AF75D5F6}"/>
               </a:ext>
             </a:extLst>
           </p:cNvPr>
@@ -15683,8 +15683,8 @@
         </p:blipFill>
         <p:spPr>
           <a:xfrm>
-            <a:off x="1879734" y="1762125"/>
-            <a:ext cx="5387708" cy="4699000"/>
+            <a:off x="1883840" y="1762125"/>
+            <a:ext cx="5379495" cy="4699000"/>
           </a:xfrm>
         </p:spPr>
       </p:pic>
@@ -16058,21 +16058,110 @@
           </a:p>
         </p:txBody>
       </p:sp>
+      <p:sp>
+        <p:nvSpPr>
+          <p:cNvPr id="3" name="Foliennummernplatzhalter 2">
+            <a:extLst>
+              <a:ext uri="{FF2B5EF4-FFF2-40B4-BE49-F238E27FC236}">
+                <a16:creationId xmlns:a16="http://schemas.microsoft.com/office/drawing/2014/main" id="{78C38F1D-943A-419F-A6E0-D18F3CB8451A}"/>
+              </a:ext>
+            </a:extLst>
+          </p:cNvPr>
+          <p:cNvSpPr>
+            <a:spLocks noGrp="1"/>
+          </p:cNvSpPr>
+          <p:nvPr>
+            <p:ph type="sldNum" sz="quarter" idx="16"/>
+          </p:nvPr>
+        </p:nvSpPr>
+        <p:spPr/>
+        <p:txBody>
+          <a:bodyPr/>
+          <a:lstStyle/>
+          <a:p>
+            <a:fld id="{CE58CB1E-F828-4F11-99E0-327109AF9DA4}" type="slidenum">
+              <a:rPr lang="de-DE" smtClean="0"/>
+              <a:pPr/>
+              <a:t>7</a:t>
+            </a:fld>
+            <a:endParaRPr lang="de-DE" dirty="0"/>
+          </a:p>
+        </p:txBody>
+      </p:sp>
+      <p:sp>
+        <p:nvSpPr>
+          <p:cNvPr id="4" name="Fußzeilenplatzhalter 3">
+            <a:extLst>
+              <a:ext uri="{FF2B5EF4-FFF2-40B4-BE49-F238E27FC236}">
+                <a16:creationId xmlns:a16="http://schemas.microsoft.com/office/drawing/2014/main" id="{76953924-FAB8-4268-8EE9-4D1C1A827178}"/>
+              </a:ext>
+            </a:extLst>
+          </p:cNvPr>
+          <p:cNvSpPr>
+            <a:spLocks noGrp="1"/>
+          </p:cNvSpPr>
+          <p:nvPr>
+            <p:ph type="ftr" sz="quarter" idx="17"/>
+          </p:nvPr>
+        </p:nvSpPr>
+        <p:spPr/>
+        <p:txBody>
+          <a:bodyPr/>
+          <a:lstStyle/>
+          <a:p>
+            <a:r>
+              <a:rPr lang="de-DE"/>
+              <a:t>Dr. rer. nat. Erika Mustermann (TUM) | kann beliebig erweitert werden | Infos mit Strich trennen</a:t>
+            </a:r>
+            <a:endParaRPr lang="en-US" dirty="0"/>
+          </a:p>
+        </p:txBody>
+      </p:sp>
+      <p:sp>
+        <p:nvSpPr>
+          <p:cNvPr id="5" name="Titel 4">
+            <a:extLst>
+              <a:ext uri="{FF2B5EF4-FFF2-40B4-BE49-F238E27FC236}">
+                <a16:creationId xmlns:a16="http://schemas.microsoft.com/office/drawing/2014/main" id="{1B8E4F84-A7E1-4260-B93F-2BE334470B32}"/>
+              </a:ext>
+            </a:extLst>
+          </p:cNvPr>
+          <p:cNvSpPr>
+            <a:spLocks noGrp="1"/>
+          </p:cNvSpPr>
+          <p:nvPr>
+            <p:ph type="title"/>
+          </p:nvPr>
+        </p:nvSpPr>
+        <p:spPr/>
+        <p:txBody>
+          <a:bodyPr/>
+          <a:lstStyle/>
+          <a:p>
+            <a:r>
+              <a:rPr lang="de-DE" dirty="0" err="1"/>
+              <a:t>Usr</a:t>
+            </a:r>
+            <a:r>
+              <a:rPr lang="de-DE" dirty="0"/>
+              <a:t> &amp; Player &amp; Dealer</a:t>
+            </a:r>
+          </a:p>
+        </p:txBody>
+      </p:sp>
       <p:pic>
         <p:nvPicPr>
-          <p:cNvPr id="8" name="Inhaltsplatzhalter 7" descr="Ein Bild, das Screenshot enthält.&#10;&#10;Automatisch generierte Beschreibung">
+          <p:cNvPr id="7" name="Grafik 6" descr="Ein Bild, das Screenshot enthält.&#10;&#10;Automatisch generierte Beschreibung">
             <a:extLst>
               <a:ext uri="{FF2B5EF4-FFF2-40B4-BE49-F238E27FC236}">
-                <a16:creationId xmlns:a16="http://schemas.microsoft.com/office/drawing/2014/main" id="{2323238E-B959-44A9-AD1D-ACFE58D1B583}"/>
+                <a16:creationId xmlns:a16="http://schemas.microsoft.com/office/drawing/2014/main" id="{74D55D4F-3896-4DF5-B415-0F2372E699A8}"/>
               </a:ext>
             </a:extLst>
           </p:cNvPr>
           <p:cNvPicPr>
-            <a:picLocks noGrp="1" noChangeAspect="1"/>
+            <a:picLocks noChangeAspect="1"/>
           </p:cNvPicPr>
-          <p:nvPr>
-            <p:ph idx="15"/>
-          </p:nvPr>
+          <p:nvPr/>
         </p:nvPicPr>
         <p:blipFill>
           <a:blip r:embed="rId2"/>
@@ -16082,17 +16171,20 @@
         </p:blipFill>
         <p:spPr>
           <a:xfrm>
-            <a:off x="5783810" y="1762125"/>
-            <a:ext cx="1907080" cy="4687888"/>
+            <a:off x="5921571" y="1428003"/>
+            <a:ext cx="1879400" cy="4831714"/>
           </a:xfrm>
+          <a:prstGeom prst="rect">
+            <a:avLst/>
+          </a:prstGeom>
         </p:spPr>
       </p:pic>
       <p:sp>
         <p:nvSpPr>
-          <p:cNvPr id="3" name="Foliennummernplatzhalter 2">
+          <p:cNvPr id="10" name="Inhaltsplatzhalter 9">
             <a:extLst>
               <a:ext uri="{FF2B5EF4-FFF2-40B4-BE49-F238E27FC236}">
-                <a16:creationId xmlns:a16="http://schemas.microsoft.com/office/drawing/2014/main" id="{78C38F1D-943A-419F-A6E0-D18F3CB8451A}"/>
+                <a16:creationId xmlns:a16="http://schemas.microsoft.com/office/drawing/2014/main" id="{3FF50593-7736-4855-8CA4-92901D752AF8}"/>
               </a:ext>
             </a:extLst>
           </p:cNvPr>
@@ -16100,7 +16192,7 @@
             <a:spLocks noGrp="1"/>
           </p:cNvSpPr>
           <p:nvPr>
-            <p:ph type="sldNum" sz="quarter" idx="16"/>
+            <p:ph idx="15"/>
           </p:nvPr>
         </p:nvSpPr>
         <p:spPr/>
@@ -16108,73 +16200,7 @@
           <a:bodyPr/>
           <a:lstStyle/>
           <a:p>
-            <a:fld id="{CE58CB1E-F828-4F11-99E0-327109AF9DA4}" type="slidenum">
-              <a:rPr lang="de-DE" smtClean="0"/>
-              <a:pPr/>
-              <a:t>7</a:t>
-            </a:fld>
             <a:endParaRPr lang="de-DE" dirty="0"/>
-          </a:p>
-        </p:txBody>
-      </p:sp>
-      <p:sp>
-        <p:nvSpPr>
-          <p:cNvPr id="4" name="Fußzeilenplatzhalter 3">
-            <a:extLst>
-              <a:ext uri="{FF2B5EF4-FFF2-40B4-BE49-F238E27FC236}">
-                <a16:creationId xmlns:a16="http://schemas.microsoft.com/office/drawing/2014/main" id="{76953924-FAB8-4268-8EE9-4D1C1A827178}"/>
-              </a:ext>
-            </a:extLst>
-          </p:cNvPr>
-          <p:cNvSpPr>
-            <a:spLocks noGrp="1"/>
-          </p:cNvSpPr>
-          <p:nvPr>
-            <p:ph type="ftr" sz="quarter" idx="17"/>
-          </p:nvPr>
-        </p:nvSpPr>
-        <p:spPr/>
-        <p:txBody>
-          <a:bodyPr/>
-          <a:lstStyle/>
-          <a:p>
-            <a:r>
-              <a:rPr lang="de-DE"/>
-              <a:t>Dr. rer. nat. Erika Mustermann (TUM) | kann beliebig erweitert werden | Infos mit Strich trennen</a:t>
-            </a:r>
-            <a:endParaRPr lang="en-US" dirty="0"/>
-          </a:p>
-        </p:txBody>
-      </p:sp>
-      <p:sp>
-        <p:nvSpPr>
-          <p:cNvPr id="5" name="Titel 4">
-            <a:extLst>
-              <a:ext uri="{FF2B5EF4-FFF2-40B4-BE49-F238E27FC236}">
-                <a16:creationId xmlns:a16="http://schemas.microsoft.com/office/drawing/2014/main" id="{1B8E4F84-A7E1-4260-B93F-2BE334470B32}"/>
-              </a:ext>
-            </a:extLst>
-          </p:cNvPr>
-          <p:cNvSpPr>
-            <a:spLocks noGrp="1"/>
-          </p:cNvSpPr>
-          <p:nvPr>
-            <p:ph type="title"/>
-          </p:nvPr>
-        </p:nvSpPr>
-        <p:spPr/>
-        <p:txBody>
-          <a:bodyPr/>
-          <a:lstStyle/>
-          <a:p>
-            <a:r>
-              <a:rPr lang="de-DE" dirty="0" err="1"/>
-              <a:t>Usr</a:t>
-            </a:r>
-            <a:r>
-              <a:rPr lang="de-DE" dirty="0"/>
-              <a:t> &amp; Player &amp; Dealer</a:t>
-            </a:r>
           </a:p>
         </p:txBody>
       </p:sp>
@@ -16235,7 +16261,7 @@
             </a:pPr>
             <a:r>
               <a:rPr lang="de-DE" dirty="0"/>
-              <a:t>Dealer hat das Deck</a:t>
+              <a:t>Dealer hat das Deck und eigene Hand</a:t>
             </a:r>
           </a:p>
           <a:p>
@@ -16246,6 +16272,16 @@
             <a:r>
               <a:rPr lang="de-DE" dirty="0"/>
               <a:t>Unterschiede zur Player Klasse</a:t>
+            </a:r>
+          </a:p>
+          <a:p>
+            <a:pPr marL="285750" indent="-285750">
+              <a:buFont typeface="Arial" panose="020B0604020202020204" pitchFamily="34" charset="0"/>
+              <a:buChar char="•"/>
+            </a:pPr>
+            <a:r>
+              <a:rPr lang="de-DE" dirty="0"/>
+              <a:t>Funktionalität: Karten austeilen und Insurance evaluieren</a:t>
             </a:r>
           </a:p>
           <a:p>

</xml_diff>